<commit_message>
Update nas with pbt
</commit_message>
<xml_diff>
--- a/2020/ECP/slides/05-nas.pptx
+++ b/2020/ECP/slides/05-nas.pptx
@@ -5,19 +5,24 @@
     <p:sldMasterId id="2147483935" r:id="rId4"/>
   </p:sldMasterIdLst>
   <p:notesMasterIdLst>
-    <p:notesMasterId r:id="rId12"/>
+    <p:notesMasterId r:id="rId17"/>
   </p:notesMasterIdLst>
   <p:handoutMasterIdLst>
-    <p:handoutMasterId r:id="rId13"/>
+    <p:handoutMasterId r:id="rId18"/>
   </p:handoutMasterIdLst>
   <p:sldIdLst>
     <p:sldId id="385" r:id="rId5"/>
     <p:sldId id="404" r:id="rId6"/>
-    <p:sldId id="405" r:id="rId7"/>
-    <p:sldId id="420" r:id="rId8"/>
-    <p:sldId id="421" r:id="rId9"/>
-    <p:sldId id="407" r:id="rId10"/>
-    <p:sldId id="393" r:id="rId11"/>
+    <p:sldId id="422" r:id="rId7"/>
+    <p:sldId id="426" r:id="rId8"/>
+    <p:sldId id="425" r:id="rId9"/>
+    <p:sldId id="427" r:id="rId10"/>
+    <p:sldId id="424" r:id="rId11"/>
+    <p:sldId id="405" r:id="rId12"/>
+    <p:sldId id="420" r:id="rId13"/>
+    <p:sldId id="421" r:id="rId14"/>
+    <p:sldId id="407" r:id="rId15"/>
+    <p:sldId id="393" r:id="rId16"/>
   </p:sldIdLst>
   <p:sldSz cx="12188825" cy="6858000"/>
   <p:notesSz cx="7010400" cy="9296400"/>
@@ -267,7 +272,7 @@
           <a:p>
             <a:fld id="{0B842F42-2CE9-4E35-95C1-410DC08A50B1}" type="datetimeFigureOut">
               <a:rPr lang="en-US" smtClean="0"/>
-              <a:t>1/28/20</a:t>
+              <a:t>2/3/20</a:t>
             </a:fld>
             <a:endParaRPr lang="en-US"/>
           </a:p>
@@ -432,7 +437,7 @@
           <a:p>
             <a:fld id="{6F282904-F315-4730-8D91-37D99E141A6F}" type="datetimeFigureOut">
               <a:rPr lang="en-US" smtClean="0"/>
-              <a:t>1/28/20</a:t>
+              <a:t>2/3/20</a:t>
             </a:fld>
             <a:endParaRPr lang="en-US"/>
           </a:p>
@@ -3208,7 +3213,7 @@
         <p:spPr>
           <a:xfrm>
             <a:off x="365760" y="411481"/>
-            <a:ext cx="7525637" cy="510909"/>
+            <a:ext cx="7525637" cy="929485"/>
           </a:xfrm>
         </p:spPr>
         <p:txBody>
@@ -3217,7 +3222,7 @@
           <a:p>
             <a:r>
               <a:rPr lang="en-US" dirty="0"/>
-              <a:t>Neural Architecture Search  </a:t>
+              <a:t>Hyperparameter Optimization &amp; Neural Architecture Search  </a:t>
             </a:r>
             <a:endParaRPr lang="en-US" i="1" dirty="0"/>
           </a:p>
@@ -3375,459 +3380,7 @@
 </p:sld>
 </file>
 
-<file path=ppt/slides/slide2.xml><?xml version="1.0" encoding="utf-8"?>
-<p:sld xmlns:a="http://schemas.openxmlformats.org/drawingml/2006/main" xmlns:r="http://schemas.openxmlformats.org/officeDocument/2006/relationships" xmlns:p="http://schemas.openxmlformats.org/presentationml/2006/main">
-  <p:cSld>
-    <p:spTree>
-      <p:nvGrpSpPr>
-        <p:cNvPr id="1" name=""/>
-        <p:cNvGrpSpPr/>
-        <p:nvPr/>
-      </p:nvGrpSpPr>
-      <p:grpSpPr>
-        <a:xfrm>
-          <a:off x="0" y="0"/>
-          <a:ext cx="0" cy="0"/>
-          <a:chOff x="0" y="0"/>
-          <a:chExt cx="0" cy="0"/>
-        </a:xfrm>
-      </p:grpSpPr>
-      <p:sp>
-        <p:nvSpPr>
-          <p:cNvPr id="2" name="Title 1">
-            <a:extLst>
-              <a:ext uri="{FF2B5EF4-FFF2-40B4-BE49-F238E27FC236}">
-                <a16:creationId xmlns:a16="http://schemas.microsoft.com/office/drawing/2014/main" id="{B0E33EF4-7CD6-D546-972C-5F24984D6602}"/>
-              </a:ext>
-            </a:extLst>
-          </p:cNvPr>
-          <p:cNvSpPr>
-            <a:spLocks noGrp="1"/>
-          </p:cNvSpPr>
-          <p:nvPr>
-            <p:ph type="title"/>
-          </p:nvPr>
-        </p:nvSpPr>
-        <p:spPr/>
-        <p:txBody>
-          <a:bodyPr/>
-          <a:lstStyle/>
-          <a:p>
-            <a:r>
-              <a:rPr lang="en-US" dirty="0"/>
-              <a:t>Talk Outline</a:t>
-            </a:r>
-          </a:p>
-        </p:txBody>
-      </p:sp>
-      <p:sp>
-        <p:nvSpPr>
-          <p:cNvPr id="3" name="Content Placeholder 2">
-            <a:extLst>
-              <a:ext uri="{FF2B5EF4-FFF2-40B4-BE49-F238E27FC236}">
-                <a16:creationId xmlns:a16="http://schemas.microsoft.com/office/drawing/2014/main" id="{79DDA83B-D33A-1340-A2A9-75273506FE76}"/>
-              </a:ext>
-            </a:extLst>
-          </p:cNvPr>
-          <p:cNvSpPr>
-            <a:spLocks noGrp="1"/>
-          </p:cNvSpPr>
-          <p:nvPr>
-            <p:ph idx="1"/>
-          </p:nvPr>
-        </p:nvSpPr>
-        <p:spPr/>
-        <p:txBody>
-          <a:bodyPr/>
-          <a:lstStyle/>
-          <a:p>
-            <a:r>
-              <a:rPr lang="en-US" dirty="0"/>
-              <a:t>Background</a:t>
-            </a:r>
-          </a:p>
-          <a:p>
-            <a:r>
-              <a:rPr lang="en-US" dirty="0"/>
-              <a:t>DARTS algorithm</a:t>
-            </a:r>
-          </a:p>
-          <a:p>
-            <a:r>
-              <a:rPr lang="en-US" dirty="0"/>
-              <a:t>CANDLE implementation</a:t>
-            </a:r>
-          </a:p>
-          <a:p>
-            <a:pPr marL="0" indent="0">
-              <a:buNone/>
-            </a:pPr>
-            <a:r>
-              <a:rPr lang="en-US" dirty="0"/>
-              <a:t> </a:t>
-            </a:r>
-          </a:p>
-        </p:txBody>
-      </p:sp>
-    </p:spTree>
-    <p:extLst>
-      <p:ext uri="{BB962C8B-B14F-4D97-AF65-F5344CB8AC3E}">
-        <p14:creationId xmlns:p14="http://schemas.microsoft.com/office/powerpoint/2010/main" val="1014811772"/>
-      </p:ext>
-    </p:extLst>
-  </p:cSld>
-  <p:clrMapOvr>
-    <a:masterClrMapping/>
-  </p:clrMapOvr>
-</p:sld>
-</file>
-
-<file path=ppt/slides/slide3.xml><?xml version="1.0" encoding="utf-8"?>
-<p:sld xmlns:a="http://schemas.openxmlformats.org/drawingml/2006/main" xmlns:r="http://schemas.openxmlformats.org/officeDocument/2006/relationships" xmlns:p="http://schemas.openxmlformats.org/presentationml/2006/main">
-  <p:cSld>
-    <p:spTree>
-      <p:nvGrpSpPr>
-        <p:cNvPr id="1" name=""/>
-        <p:cNvGrpSpPr/>
-        <p:nvPr/>
-      </p:nvGrpSpPr>
-      <p:grpSpPr>
-        <a:xfrm>
-          <a:off x="0" y="0"/>
-          <a:ext cx="0" cy="0"/>
-          <a:chOff x="0" y="0"/>
-          <a:chExt cx="0" cy="0"/>
-        </a:xfrm>
-      </p:grpSpPr>
-      <p:sp>
-        <p:nvSpPr>
-          <p:cNvPr id="2" name="Title 1">
-            <a:extLst>
-              <a:ext uri="{FF2B5EF4-FFF2-40B4-BE49-F238E27FC236}">
-                <a16:creationId xmlns:a16="http://schemas.microsoft.com/office/drawing/2014/main" id="{D40BF1D8-B53E-6546-9019-F8E98F00E2A7}"/>
-              </a:ext>
-            </a:extLst>
-          </p:cNvPr>
-          <p:cNvSpPr>
-            <a:spLocks noGrp="1"/>
-          </p:cNvSpPr>
-          <p:nvPr>
-            <p:ph type="title"/>
-          </p:nvPr>
-        </p:nvSpPr>
-        <p:spPr/>
-        <p:txBody>
-          <a:bodyPr/>
-          <a:lstStyle/>
-          <a:p>
-            <a:r>
-              <a:rPr lang="en-US" dirty="0"/>
-              <a:t>Background</a:t>
-            </a:r>
-          </a:p>
-        </p:txBody>
-      </p:sp>
-      <p:sp>
-        <p:nvSpPr>
-          <p:cNvPr id="3" name="Content Placeholder 2">
-            <a:extLst>
-              <a:ext uri="{FF2B5EF4-FFF2-40B4-BE49-F238E27FC236}">
-                <a16:creationId xmlns:a16="http://schemas.microsoft.com/office/drawing/2014/main" id="{C7BD6F05-45FC-BA40-BA22-FD994C306877}"/>
-              </a:ext>
-            </a:extLst>
-          </p:cNvPr>
-          <p:cNvSpPr>
-            <a:spLocks noGrp="1"/>
-          </p:cNvSpPr>
-          <p:nvPr>
-            <p:ph idx="1"/>
-          </p:nvPr>
-        </p:nvSpPr>
-        <p:spPr/>
-        <p:txBody>
-          <a:bodyPr/>
-          <a:lstStyle/>
-          <a:p>
-            <a:r>
-              <a:rPr lang="en-US" dirty="0"/>
-              <a:t>How does one pick a deep learning architecture?</a:t>
-            </a:r>
-          </a:p>
-          <a:p>
-            <a:pPr lvl="1"/>
-            <a:r>
-              <a:rPr lang="en-US" dirty="0"/>
-              <a:t>What kinds of layers?</a:t>
-            </a:r>
-          </a:p>
-          <a:p>
-            <a:pPr lvl="1"/>
-            <a:r>
-              <a:rPr lang="en-US" dirty="0"/>
-              <a:t>How is the graph structured?</a:t>
-            </a:r>
-          </a:p>
-          <a:p>
-            <a:r>
-              <a:rPr lang="en-US" dirty="0"/>
-              <a:t>Options:</a:t>
-            </a:r>
-          </a:p>
-          <a:p>
-            <a:pPr marL="803275" lvl="1" indent="-457200">
-              <a:buFont typeface="+mj-lt"/>
-              <a:buAutoNum type="arabicPeriod"/>
-            </a:pPr>
-            <a:r>
-              <a:rPr lang="en-US" dirty="0"/>
-              <a:t>Off-the-shelf: start from known architecture for, e.g., image data</a:t>
-            </a:r>
-          </a:p>
-          <a:p>
-            <a:pPr marL="803275" lvl="1" indent="-457200">
-              <a:buFont typeface="+mj-lt"/>
-              <a:buAutoNum type="arabicPeriod"/>
-            </a:pPr>
-            <a:r>
-              <a:rPr lang="en-US" dirty="0"/>
-              <a:t>Manually: Design from scratch via trial-and-error</a:t>
-            </a:r>
-          </a:p>
-          <a:p>
-            <a:pPr marL="803275" lvl="1" indent="-457200">
-              <a:buFont typeface="+mj-lt"/>
-              <a:buAutoNum type="arabicPeriod"/>
-            </a:pPr>
-            <a:r>
-              <a:rPr lang="en-US" dirty="0"/>
-              <a:t>Machine learning: neural architecture search (NAS)</a:t>
-            </a:r>
-          </a:p>
-          <a:p>
-            <a:pPr marL="1092200" lvl="2" indent="-457200"/>
-            <a:r>
-              <a:rPr lang="en-US" dirty="0"/>
-              <a:t>Search model descriptions of neural network specifications with given search space</a:t>
-            </a:r>
-          </a:p>
-          <a:p>
-            <a:pPr marL="1092200" lvl="2" indent="-457200"/>
-            <a:r>
-              <a:rPr lang="en-US" dirty="0"/>
-              <a:t>Learn model architecture by training large number of models</a:t>
-            </a:r>
-          </a:p>
-          <a:p>
-            <a:pPr marL="1092200" lvl="2" indent="-457200"/>
-            <a:endParaRPr lang="en-US" dirty="0"/>
-          </a:p>
-          <a:p>
-            <a:pPr lvl="1"/>
-            <a:endParaRPr lang="en-US" dirty="0"/>
-          </a:p>
-          <a:p>
-            <a:endParaRPr lang="en-US" dirty="0"/>
-          </a:p>
-          <a:p>
-            <a:pPr lvl="1"/>
-            <a:endParaRPr lang="en-US" dirty="0"/>
-          </a:p>
-        </p:txBody>
-      </p:sp>
-    </p:spTree>
-    <p:extLst>
-      <p:ext uri="{BB962C8B-B14F-4D97-AF65-F5344CB8AC3E}">
-        <p14:creationId xmlns:p14="http://schemas.microsoft.com/office/powerpoint/2010/main" val="2042118168"/>
-      </p:ext>
-    </p:extLst>
-  </p:cSld>
-  <p:clrMapOvr>
-    <a:masterClrMapping/>
-  </p:clrMapOvr>
-</p:sld>
-</file>
-
-<file path=ppt/slides/slide4.xml><?xml version="1.0" encoding="utf-8"?>
-<p:sld xmlns:a="http://schemas.openxmlformats.org/drawingml/2006/main" xmlns:r="http://schemas.openxmlformats.org/officeDocument/2006/relationships" xmlns:p="http://schemas.openxmlformats.org/presentationml/2006/main">
-  <p:cSld>
-    <p:spTree>
-      <p:nvGrpSpPr>
-        <p:cNvPr id="1" name=""/>
-        <p:cNvGrpSpPr/>
-        <p:nvPr/>
-      </p:nvGrpSpPr>
-      <p:grpSpPr>
-        <a:xfrm>
-          <a:off x="0" y="0"/>
-          <a:ext cx="0" cy="0"/>
-          <a:chOff x="0" y="0"/>
-          <a:chExt cx="0" cy="0"/>
-        </a:xfrm>
-      </p:grpSpPr>
-      <p:sp>
-        <p:nvSpPr>
-          <p:cNvPr id="2" name="Title 1">
-            <a:extLst>
-              <a:ext uri="{FF2B5EF4-FFF2-40B4-BE49-F238E27FC236}">
-                <a16:creationId xmlns:a16="http://schemas.microsoft.com/office/drawing/2014/main" id="{8F3FA2AD-6F1D-6C4D-B5CB-D3DF710D3D8E}"/>
-              </a:ext>
-            </a:extLst>
-          </p:cNvPr>
-          <p:cNvSpPr>
-            <a:spLocks noGrp="1"/>
-          </p:cNvSpPr>
-          <p:nvPr>
-            <p:ph type="title"/>
-          </p:nvPr>
-        </p:nvSpPr>
-        <p:spPr/>
-        <p:txBody>
-          <a:bodyPr/>
-          <a:lstStyle/>
-          <a:p>
-            <a:r>
-              <a:rPr lang="en-US" dirty="0"/>
-              <a:t>DARTS algorithm</a:t>
-            </a:r>
-          </a:p>
-        </p:txBody>
-      </p:sp>
-      <p:sp>
-        <p:nvSpPr>
-          <p:cNvPr id="3" name="Content Placeholder 2">
-            <a:extLst>
-              <a:ext uri="{FF2B5EF4-FFF2-40B4-BE49-F238E27FC236}">
-                <a16:creationId xmlns:a16="http://schemas.microsoft.com/office/drawing/2014/main" id="{FDCCBF8A-8C06-6F49-8028-A0202F7EBA88}"/>
-              </a:ext>
-            </a:extLst>
-          </p:cNvPr>
-          <p:cNvSpPr>
-            <a:spLocks noGrp="1"/>
-          </p:cNvSpPr>
-          <p:nvPr>
-            <p:ph idx="1"/>
-          </p:nvPr>
-        </p:nvSpPr>
-        <p:spPr/>
-        <p:txBody>
-          <a:bodyPr/>
-          <a:lstStyle/>
-          <a:p>
-            <a:r>
-              <a:rPr lang="en-US" dirty="0"/>
-              <a:t>Computational challenge: NAS is expensive</a:t>
-            </a:r>
-          </a:p>
-          <a:p>
-            <a:pPr lvl="1"/>
-            <a:r>
-              <a:rPr lang="en-US" dirty="0"/>
-              <a:t>Standard techniques may require 10</a:t>
-            </a:r>
-            <a:r>
-              <a:rPr lang="en-US" baseline="30000" dirty="0"/>
-              <a:t>5</a:t>
-            </a:r>
-            <a:r>
-              <a:rPr lang="en-US" dirty="0"/>
-              <a:t> GPU hours</a:t>
-            </a:r>
-          </a:p>
-          <a:p>
-            <a:pPr lvl="1"/>
-            <a:r>
-              <a:rPr lang="en-US" dirty="0"/>
-              <a:t>Alternative ’one-shot’ techniques: multiple architectures as subgraphs</a:t>
-            </a:r>
-          </a:p>
-          <a:p>
-            <a:endParaRPr lang="en-US" dirty="0"/>
-          </a:p>
-          <a:p>
-            <a:r>
-              <a:rPr lang="en-US" dirty="0"/>
-              <a:t>DARTS (</a:t>
-            </a:r>
-            <a:r>
-              <a:rPr lang="en-US" dirty="0">
-                <a:hlinkClick r:id="rId2"/>
-              </a:rPr>
-              <a:t>https://arxiv.org/abs/1806.09055</a:t>
-            </a:r>
-            <a:r>
-              <a:rPr lang="en-US" dirty="0"/>
-              <a:t>)</a:t>
-            </a:r>
-          </a:p>
-          <a:p>
-            <a:pPr lvl="1"/>
-            <a:r>
-              <a:rPr lang="en-US" dirty="0"/>
-              <a:t>Differentiable architecture search</a:t>
-            </a:r>
-          </a:p>
-          <a:p>
-            <a:pPr lvl="1"/>
-            <a:r>
-              <a:rPr lang="en-US" dirty="0"/>
-              <a:t>Continuous search space</a:t>
-            </a:r>
-          </a:p>
-          <a:p>
-            <a:pPr lvl="1"/>
-            <a:r>
-              <a:rPr lang="en-US" dirty="0"/>
-              <a:t>Bilevel optimization: architecture and weights</a:t>
-            </a:r>
-          </a:p>
-          <a:p>
-            <a:pPr lvl="1"/>
-            <a:endParaRPr lang="en-US" dirty="0"/>
-          </a:p>
-        </p:txBody>
-      </p:sp>
-      <p:pic>
-        <p:nvPicPr>
-          <p:cNvPr id="5" name="Picture 4">
-            <a:extLst>
-              <a:ext uri="{FF2B5EF4-FFF2-40B4-BE49-F238E27FC236}">
-                <a16:creationId xmlns:a16="http://schemas.microsoft.com/office/drawing/2014/main" id="{5421AE36-E03A-5940-ADF8-18715579FE0C}"/>
-              </a:ext>
-            </a:extLst>
-          </p:cNvPr>
-          <p:cNvPicPr/>
-          <p:nvPr/>
-        </p:nvPicPr>
-        <p:blipFill>
-          <a:blip r:embed="rId3"/>
-          <a:stretch>
-            <a:fillRect/>
-          </a:stretch>
-        </p:blipFill>
-        <p:spPr>
-          <a:xfrm>
-            <a:off x="7620000" y="3130396"/>
-            <a:ext cx="4203065" cy="2650293"/>
-          </a:xfrm>
-          <a:prstGeom prst="rect">
-            <a:avLst/>
-          </a:prstGeom>
-        </p:spPr>
-      </p:pic>
-    </p:spTree>
-    <p:extLst>
-      <p:ext uri="{BB962C8B-B14F-4D97-AF65-F5344CB8AC3E}">
-        <p14:creationId xmlns:p14="http://schemas.microsoft.com/office/powerpoint/2010/main" val="1327185159"/>
-      </p:ext>
-    </p:extLst>
-  </p:cSld>
-  <p:clrMapOvr>
-    <a:masterClrMapping/>
-  </p:clrMapOvr>
-</p:sld>
-</file>
-
-<file path=ppt/slides/slide5.xml><?xml version="1.0" encoding="utf-8"?>
+<file path=ppt/slides/slide10.xml><?xml version="1.0" encoding="utf-8"?>
 <p:sld xmlns:a="http://schemas.openxmlformats.org/drawingml/2006/main" xmlns:r="http://schemas.openxmlformats.org/officeDocument/2006/relationships" xmlns:p="http://schemas.openxmlformats.org/presentationml/2006/main">
   <p:cSld>
     <p:spTree>
@@ -3943,6 +3496,46 @@
           </a:prstGeom>
         </p:spPr>
       </p:pic>
+      <p:sp>
+        <p:nvSpPr>
+          <p:cNvPr id="3" name="TextBox 2">
+            <a:extLst>
+              <a:ext uri="{FF2B5EF4-FFF2-40B4-BE49-F238E27FC236}">
+                <a16:creationId xmlns:a16="http://schemas.microsoft.com/office/drawing/2014/main" id="{6BA5D19F-98A2-5F42-B786-A0B3057E078C}"/>
+              </a:ext>
+            </a:extLst>
+          </p:cNvPr>
+          <p:cNvSpPr txBox="1"/>
+          <p:nvPr/>
+        </p:nvSpPr>
+        <p:spPr>
+          <a:xfrm>
+            <a:off x="5643498" y="872465"/>
+            <a:ext cx="5750293" cy="341632"/>
+          </a:xfrm>
+          <a:prstGeom prst="rect">
+            <a:avLst/>
+          </a:prstGeom>
+          <a:noFill/>
+        </p:spPr>
+        <p:txBody>
+          <a:bodyPr wrap="none" rtlCol="0">
+            <a:spAutoFit/>
+          </a:bodyPr>
+          <a:lstStyle/>
+          <a:p>
+            <a:pPr algn="ctr">
+              <a:lnSpc>
+                <a:spcPct val="90000"/>
+              </a:lnSpc>
+            </a:pPr>
+            <a:r>
+              <a:rPr lang="en-US" dirty="0"/>
+              <a:t>keep connection but maybe make more homogeneous</a:t>
+            </a:r>
+          </a:p>
+        </p:txBody>
+      </p:sp>
     </p:spTree>
     <p:extLst>
       <p:ext uri="{BB962C8B-B14F-4D97-AF65-F5344CB8AC3E}">
@@ -3956,7 +3549,7 @@
 </p:sld>
 </file>
 
-<file path=ppt/slides/slide6.xml><?xml version="1.0" encoding="utf-8"?>
+<file path=ppt/slides/slide11.xml><?xml version="1.0" encoding="utf-8"?>
 <p:sld xmlns:a="http://schemas.openxmlformats.org/drawingml/2006/main" xmlns:r="http://schemas.openxmlformats.org/officeDocument/2006/relationships" xmlns:p="http://schemas.openxmlformats.org/presentationml/2006/main">
   <p:cSld>
     <p:spTree>
@@ -4028,7 +3621,7 @@
           <a:lstStyle/>
           <a:p>
             <a:r>
-              <a:rPr lang="en-US" spc="-1" dirty="0">
+              <a:rPr lang="en-US" sz="2400" spc="-1" dirty="0">
                 <a:solidFill>
                   <a:srgbClr val="232425"/>
                 </a:solidFill>
@@ -4039,18 +3632,18 @@
           </a:p>
           <a:p>
             <a:r>
-              <a:rPr lang="en-US" spc="-1" dirty="0">
+              <a:rPr lang="en-US" sz="2400" spc="-1" dirty="0">
                 <a:solidFill>
                   <a:srgbClr val="232425"/>
                 </a:solidFill>
                 <a:latin typeface="Arial"/>
               </a:rPr>
-              <a:t>Natural language processing (NLP) example in Benchmark P3B5</a:t>
-            </a:r>
-          </a:p>
-          <a:p>
-            <a:r>
-              <a:rPr lang="en-US" spc="-1" dirty="0">
+              <a:t>Natural language processing example in Benchmark P3B5 (develop branch)</a:t>
+            </a:r>
+          </a:p>
+          <a:p>
+            <a:r>
+              <a:rPr lang="en-US" sz="2400" spc="-1" dirty="0">
                 <a:solidFill>
                   <a:srgbClr val="232425"/>
                 </a:solidFill>
@@ -4145,7 +3738,7 @@
 </p:sld>
 </file>
 
-<file path=ppt/slides/slide7.xml><?xml version="1.0" encoding="utf-8"?>
+<file path=ppt/slides/slide12.xml><?xml version="1.0" encoding="utf-8"?>
 <p:sld xmlns:a="http://schemas.openxmlformats.org/drawingml/2006/main" xmlns:r="http://schemas.openxmlformats.org/officeDocument/2006/relationships" xmlns:p="http://schemas.openxmlformats.org/presentationml/2006/main">
   <p:cSld>
     <p:spTree>
@@ -4284,6 +3877,3689 @@
     <p:extLst>
       <p:ext uri="{BB962C8B-B14F-4D97-AF65-F5344CB8AC3E}">
         <p14:creationId xmlns:p14="http://schemas.microsoft.com/office/powerpoint/2010/main" val="1264112038"/>
+      </p:ext>
+    </p:extLst>
+  </p:cSld>
+  <p:clrMapOvr>
+    <a:masterClrMapping/>
+  </p:clrMapOvr>
+</p:sld>
+</file>
+
+<file path=ppt/slides/slide2.xml><?xml version="1.0" encoding="utf-8"?>
+<p:sld xmlns:a="http://schemas.openxmlformats.org/drawingml/2006/main" xmlns:r="http://schemas.openxmlformats.org/officeDocument/2006/relationships" xmlns:p="http://schemas.openxmlformats.org/presentationml/2006/main">
+  <p:cSld>
+    <p:spTree>
+      <p:nvGrpSpPr>
+        <p:cNvPr id="1" name=""/>
+        <p:cNvGrpSpPr/>
+        <p:nvPr/>
+      </p:nvGrpSpPr>
+      <p:grpSpPr>
+        <a:xfrm>
+          <a:off x="0" y="0"/>
+          <a:ext cx="0" cy="0"/>
+          <a:chOff x="0" y="0"/>
+          <a:chExt cx="0" cy="0"/>
+        </a:xfrm>
+      </p:grpSpPr>
+      <p:sp>
+        <p:nvSpPr>
+          <p:cNvPr id="2" name="Title 1">
+            <a:extLst>
+              <a:ext uri="{FF2B5EF4-FFF2-40B4-BE49-F238E27FC236}">
+                <a16:creationId xmlns:a16="http://schemas.microsoft.com/office/drawing/2014/main" id="{B0E33EF4-7CD6-D546-972C-5F24984D6602}"/>
+              </a:ext>
+            </a:extLst>
+          </p:cNvPr>
+          <p:cNvSpPr>
+            <a:spLocks noGrp="1"/>
+          </p:cNvSpPr>
+          <p:nvPr>
+            <p:ph type="title"/>
+          </p:nvPr>
+        </p:nvSpPr>
+        <p:spPr/>
+        <p:txBody>
+          <a:bodyPr/>
+          <a:lstStyle/>
+          <a:p>
+            <a:r>
+              <a:rPr lang="en-US" dirty="0"/>
+              <a:t>Talk Outline</a:t>
+            </a:r>
+          </a:p>
+        </p:txBody>
+      </p:sp>
+      <p:sp>
+        <p:nvSpPr>
+          <p:cNvPr id="3" name="Content Placeholder 2">
+            <a:extLst>
+              <a:ext uri="{FF2B5EF4-FFF2-40B4-BE49-F238E27FC236}">
+                <a16:creationId xmlns:a16="http://schemas.microsoft.com/office/drawing/2014/main" id="{79DDA83B-D33A-1340-A2A9-75273506FE76}"/>
+              </a:ext>
+            </a:extLst>
+          </p:cNvPr>
+          <p:cNvSpPr>
+            <a:spLocks noGrp="1"/>
+          </p:cNvSpPr>
+          <p:nvPr>
+            <p:ph idx="1"/>
+          </p:nvPr>
+        </p:nvSpPr>
+        <p:spPr/>
+        <p:txBody>
+          <a:bodyPr/>
+          <a:lstStyle/>
+          <a:p>
+            <a:r>
+              <a:rPr lang="en-US" dirty="0"/>
+              <a:t>Background</a:t>
+            </a:r>
+          </a:p>
+          <a:p>
+            <a:r>
+              <a:rPr lang="en-US" dirty="0"/>
+              <a:t>Hyperparameter optimization (HPO)</a:t>
+            </a:r>
+          </a:p>
+          <a:p>
+            <a:pPr lvl="1"/>
+            <a:r>
+              <a:rPr lang="en-US" dirty="0"/>
+              <a:t>Background</a:t>
+            </a:r>
+          </a:p>
+          <a:p>
+            <a:pPr lvl="1"/>
+            <a:r>
+              <a:rPr lang="en-US" dirty="0"/>
+              <a:t>Population-based training</a:t>
+            </a:r>
+          </a:p>
+          <a:p>
+            <a:r>
+              <a:rPr lang="en-US" dirty="0"/>
+              <a:t>Neural architecture search (NAS)</a:t>
+            </a:r>
+          </a:p>
+          <a:p>
+            <a:pPr lvl="1"/>
+            <a:r>
+              <a:rPr lang="en-US" dirty="0"/>
+              <a:t>Background</a:t>
+            </a:r>
+          </a:p>
+          <a:p>
+            <a:pPr lvl="1"/>
+            <a:r>
+              <a:rPr lang="en-US" dirty="0"/>
+              <a:t>DARTS algorithm</a:t>
+            </a:r>
+          </a:p>
+          <a:p>
+            <a:pPr lvl="1"/>
+            <a:r>
+              <a:rPr lang="en-US" dirty="0"/>
+              <a:t>CANDLE implementation</a:t>
+            </a:r>
+          </a:p>
+          <a:p>
+            <a:pPr marL="0" indent="0">
+              <a:buNone/>
+            </a:pPr>
+            <a:r>
+              <a:rPr lang="en-US" dirty="0"/>
+              <a:t> </a:t>
+            </a:r>
+          </a:p>
+        </p:txBody>
+      </p:sp>
+    </p:spTree>
+    <p:extLst>
+      <p:ext uri="{BB962C8B-B14F-4D97-AF65-F5344CB8AC3E}">
+        <p14:creationId xmlns:p14="http://schemas.microsoft.com/office/powerpoint/2010/main" val="1014811772"/>
+      </p:ext>
+    </p:extLst>
+  </p:cSld>
+  <p:clrMapOvr>
+    <a:masterClrMapping/>
+  </p:clrMapOvr>
+</p:sld>
+</file>
+
+<file path=ppt/slides/slide3.xml><?xml version="1.0" encoding="utf-8"?>
+<p:sld xmlns:a="http://schemas.openxmlformats.org/drawingml/2006/main" xmlns:r="http://schemas.openxmlformats.org/officeDocument/2006/relationships" xmlns:p="http://schemas.openxmlformats.org/presentationml/2006/main">
+  <p:cSld>
+    <p:spTree>
+      <p:nvGrpSpPr>
+        <p:cNvPr id="1" name=""/>
+        <p:cNvGrpSpPr/>
+        <p:nvPr/>
+      </p:nvGrpSpPr>
+      <p:grpSpPr>
+        <a:xfrm>
+          <a:off x="0" y="0"/>
+          <a:ext cx="0" cy="0"/>
+          <a:chOff x="0" y="0"/>
+          <a:chExt cx="0" cy="0"/>
+        </a:xfrm>
+      </p:grpSpPr>
+      <p:sp>
+        <p:nvSpPr>
+          <p:cNvPr id="2" name="Title 1">
+            <a:extLst>
+              <a:ext uri="{FF2B5EF4-FFF2-40B4-BE49-F238E27FC236}">
+                <a16:creationId xmlns:a16="http://schemas.microsoft.com/office/drawing/2014/main" id="{F162ABB4-1161-AD45-AC9F-77E6B28D7891}"/>
+              </a:ext>
+            </a:extLst>
+          </p:cNvPr>
+          <p:cNvSpPr>
+            <a:spLocks noGrp="1"/>
+          </p:cNvSpPr>
+          <p:nvPr>
+            <p:ph type="title"/>
+          </p:nvPr>
+        </p:nvSpPr>
+        <p:spPr/>
+        <p:txBody>
+          <a:bodyPr/>
+          <a:lstStyle/>
+          <a:p>
+            <a:r>
+              <a:rPr lang="en-US" dirty="0"/>
+              <a:t>HPO background</a:t>
+            </a:r>
+          </a:p>
+        </p:txBody>
+      </p:sp>
+      <p:sp>
+        <p:nvSpPr>
+          <p:cNvPr id="3" name="Content Placeholder 2">
+            <a:extLst>
+              <a:ext uri="{FF2B5EF4-FFF2-40B4-BE49-F238E27FC236}">
+                <a16:creationId xmlns:a16="http://schemas.microsoft.com/office/drawing/2014/main" id="{B09337C2-BCF7-934D-941B-3C8219817EB2}"/>
+              </a:ext>
+            </a:extLst>
+          </p:cNvPr>
+          <p:cNvSpPr>
+            <a:spLocks noGrp="1"/>
+          </p:cNvSpPr>
+          <p:nvPr>
+            <p:ph idx="1"/>
+          </p:nvPr>
+        </p:nvSpPr>
+        <p:spPr/>
+        <p:txBody>
+          <a:bodyPr/>
+          <a:lstStyle/>
+          <a:p>
+            <a:r>
+              <a:rPr lang="en-US" dirty="0"/>
+              <a:t>How to chose optimal parameters for deep learning algorithm?</a:t>
+            </a:r>
+          </a:p>
+          <a:p>
+            <a:endParaRPr lang="en-US" dirty="0"/>
+          </a:p>
+          <a:p>
+            <a:r>
+              <a:rPr lang="en-US" dirty="0"/>
+              <a:t>CANDLE workflows for HPO</a:t>
+            </a:r>
+          </a:p>
+          <a:p>
+            <a:pPr lvl="1"/>
+            <a:r>
+              <a:rPr lang="en-US" dirty="0"/>
+              <a:t>User-defined parameter sets</a:t>
+            </a:r>
+          </a:p>
+          <a:p>
+            <a:pPr lvl="1"/>
+            <a:r>
+              <a:rPr lang="en-US" dirty="0"/>
+              <a:t>Grid and random searches</a:t>
+            </a:r>
+          </a:p>
+          <a:p>
+            <a:pPr lvl="1"/>
+            <a:r>
+              <a:rPr lang="en-US" dirty="0"/>
+              <a:t>Model-based optimization (</a:t>
+            </a:r>
+            <a:r>
+              <a:rPr lang="en-US" dirty="0" err="1"/>
+              <a:t>mlrMBO</a:t>
+            </a:r>
+            <a:r>
+              <a:rPr lang="en-US" dirty="0"/>
+              <a:t>)</a:t>
+            </a:r>
+          </a:p>
+          <a:p>
+            <a:pPr lvl="1"/>
+            <a:r>
+              <a:rPr lang="en-US" dirty="0"/>
+              <a:t>Population-based training (PBT)</a:t>
+            </a:r>
+          </a:p>
+          <a:p>
+            <a:pPr lvl="1"/>
+            <a:endParaRPr lang="en-US" dirty="0"/>
+          </a:p>
+        </p:txBody>
+      </p:sp>
+    </p:spTree>
+    <p:extLst>
+      <p:ext uri="{BB962C8B-B14F-4D97-AF65-F5344CB8AC3E}">
+        <p14:creationId xmlns:p14="http://schemas.microsoft.com/office/powerpoint/2010/main" val="1602187045"/>
+      </p:ext>
+    </p:extLst>
+  </p:cSld>
+  <p:clrMapOvr>
+    <a:masterClrMapping/>
+  </p:clrMapOvr>
+</p:sld>
+</file>
+
+<file path=ppt/slides/slide4.xml><?xml version="1.0" encoding="utf-8"?>
+<p:sld xmlns:a="http://schemas.openxmlformats.org/drawingml/2006/main" xmlns:r="http://schemas.openxmlformats.org/officeDocument/2006/relationships" xmlns:p="http://schemas.openxmlformats.org/presentationml/2006/main">
+  <p:cSld>
+    <p:spTree>
+      <p:nvGrpSpPr>
+        <p:cNvPr id="1" name=""/>
+        <p:cNvGrpSpPr/>
+        <p:nvPr/>
+      </p:nvGrpSpPr>
+      <p:grpSpPr>
+        <a:xfrm>
+          <a:off x="0" y="0"/>
+          <a:ext cx="0" cy="0"/>
+          <a:chOff x="0" y="0"/>
+          <a:chExt cx="0" cy="0"/>
+        </a:xfrm>
+      </p:grpSpPr>
+      <p:sp>
+        <p:nvSpPr>
+          <p:cNvPr id="24" name="Rectangle 23">
+            <a:extLst>
+              <a:ext uri="{FF2B5EF4-FFF2-40B4-BE49-F238E27FC236}">
+                <a16:creationId xmlns:a16="http://schemas.microsoft.com/office/drawing/2014/main" id="{586EF878-903A-A442-8D15-9911413A6D99}"/>
+              </a:ext>
+            </a:extLst>
+          </p:cNvPr>
+          <p:cNvSpPr/>
+          <p:nvPr/>
+        </p:nvSpPr>
+        <p:spPr>
+          <a:xfrm>
+            <a:off x="2995443" y="5500035"/>
+            <a:ext cx="8518631" cy="472965"/>
+          </a:xfrm>
+          <a:prstGeom prst="rect">
+            <a:avLst/>
+          </a:prstGeom>
+          <a:solidFill>
+            <a:schemeClr val="bg2"/>
+          </a:solidFill>
+          <a:ln>
+            <a:solidFill>
+              <a:schemeClr val="accent1"/>
+            </a:solidFill>
+          </a:ln>
+          <a:effectLst/>
+          <a:scene3d>
+            <a:camera prst="orthographicFront">
+              <a:rot lat="0" lon="0" rev="0"/>
+            </a:camera>
+            <a:lightRig rig="threePt" dir="t">
+              <a:rot lat="0" lon="0" rev="1200000"/>
+            </a:lightRig>
+          </a:scene3d>
+          <a:sp3d/>
+        </p:spPr>
+        <p:style>
+          <a:lnRef idx="0">
+            <a:schemeClr val="accent1"/>
+          </a:lnRef>
+          <a:fillRef idx="3">
+            <a:schemeClr val="accent1"/>
+          </a:fillRef>
+          <a:effectRef idx="3">
+            <a:schemeClr val="accent1"/>
+          </a:effectRef>
+          <a:fontRef idx="minor">
+            <a:schemeClr val="lt1"/>
+          </a:fontRef>
+        </p:style>
+        <p:txBody>
+          <a:bodyPr rot="0" spcFirstLastPara="0" vertOverflow="overflow" horzOverflow="overflow" vert="horz" wrap="square" lIns="45720" tIns="45720" rIns="45720" bIns="45720" numCol="1" spcCol="0" rtlCol="0" fromWordArt="0" anchor="ctr" anchorCtr="0" forceAA="0" compatLnSpc="1">
+            <a:prstTxWarp prst="textNoShape">
+              <a:avLst/>
+            </a:prstTxWarp>
+            <a:noAutofit/>
+          </a:bodyPr>
+          <a:lstStyle/>
+          <a:p>
+            <a:pPr algn="ctr">
+              <a:lnSpc>
+                <a:spcPct val="90000"/>
+              </a:lnSpc>
+            </a:pPr>
+            <a:endParaRPr lang="en-US" dirty="0">
+              <a:solidFill>
+                <a:schemeClr val="tx1"/>
+              </a:solidFill>
+            </a:endParaRPr>
+          </a:p>
+        </p:txBody>
+      </p:sp>
+      <p:sp>
+        <p:nvSpPr>
+          <p:cNvPr id="2" name="Title 1">
+            <a:extLst>
+              <a:ext uri="{FF2B5EF4-FFF2-40B4-BE49-F238E27FC236}">
+                <a16:creationId xmlns:a16="http://schemas.microsoft.com/office/drawing/2014/main" id="{C0B271F8-6C8C-C04B-AED2-A5953EB635EC}"/>
+              </a:ext>
+            </a:extLst>
+          </p:cNvPr>
+          <p:cNvSpPr>
+            <a:spLocks noGrp="1"/>
+          </p:cNvSpPr>
+          <p:nvPr>
+            <p:ph type="title"/>
+          </p:nvPr>
+        </p:nvSpPr>
+        <p:spPr/>
+        <p:txBody>
+          <a:bodyPr/>
+          <a:lstStyle/>
+          <a:p>
+            <a:r>
+              <a:rPr lang="en-US" dirty="0"/>
+              <a:t>Population-based training</a:t>
+            </a:r>
+          </a:p>
+        </p:txBody>
+      </p:sp>
+      <p:sp>
+        <p:nvSpPr>
+          <p:cNvPr id="3" name="Content Placeholder 2">
+            <a:extLst>
+              <a:ext uri="{FF2B5EF4-FFF2-40B4-BE49-F238E27FC236}">
+                <a16:creationId xmlns:a16="http://schemas.microsoft.com/office/drawing/2014/main" id="{A020F716-F3EA-B34A-B98F-C7A42B685BA6}"/>
+              </a:ext>
+            </a:extLst>
+          </p:cNvPr>
+          <p:cNvSpPr>
+            <a:spLocks noGrp="1"/>
+          </p:cNvSpPr>
+          <p:nvPr>
+            <p:ph idx="1"/>
+          </p:nvPr>
+        </p:nvSpPr>
+        <p:spPr/>
+        <p:txBody>
+          <a:bodyPr/>
+          <a:lstStyle/>
+          <a:p>
+            <a:r>
+              <a:rPr lang="en-US" dirty="0"/>
+              <a:t>Asynchronous distributed optimization algorithm</a:t>
+            </a:r>
+          </a:p>
+          <a:p>
+            <a:pPr lvl="1"/>
+            <a:r>
+              <a:rPr lang="en-US" dirty="0"/>
+              <a:t>Train multiple models independently with different hyperparameters</a:t>
+            </a:r>
+          </a:p>
+          <a:p>
+            <a:pPr lvl="1"/>
+            <a:r>
+              <a:rPr lang="en-US" dirty="0"/>
+              <a:t>Periodically replace parameters and weights poorly performing models </a:t>
+            </a:r>
+          </a:p>
+        </p:txBody>
+      </p:sp>
+      <p:sp>
+        <p:nvSpPr>
+          <p:cNvPr id="4" name="Rectangle 3">
+            <a:extLst>
+              <a:ext uri="{FF2B5EF4-FFF2-40B4-BE49-F238E27FC236}">
+                <a16:creationId xmlns:a16="http://schemas.microsoft.com/office/drawing/2014/main" id="{7C9CD55E-0CEA-EB47-A9A3-174366096C6D}"/>
+              </a:ext>
+            </a:extLst>
+          </p:cNvPr>
+          <p:cNvSpPr/>
+          <p:nvPr/>
+        </p:nvSpPr>
+        <p:spPr>
+          <a:xfrm>
+            <a:off x="639029" y="3520965"/>
+            <a:ext cx="2167233" cy="472965"/>
+          </a:xfrm>
+          <a:prstGeom prst="rect">
+            <a:avLst/>
+          </a:prstGeom>
+          <a:solidFill>
+            <a:schemeClr val="bg2"/>
+          </a:solidFill>
+          <a:ln>
+            <a:solidFill>
+              <a:schemeClr val="accent1"/>
+            </a:solidFill>
+          </a:ln>
+          <a:effectLst/>
+          <a:scene3d>
+            <a:camera prst="orthographicFront">
+              <a:rot lat="0" lon="0" rev="0"/>
+            </a:camera>
+            <a:lightRig rig="threePt" dir="t">
+              <a:rot lat="0" lon="0" rev="1200000"/>
+            </a:lightRig>
+          </a:scene3d>
+          <a:sp3d/>
+        </p:spPr>
+        <p:style>
+          <a:lnRef idx="0">
+            <a:schemeClr val="accent1"/>
+          </a:lnRef>
+          <a:fillRef idx="3">
+            <a:schemeClr val="accent1"/>
+          </a:fillRef>
+          <a:effectRef idx="3">
+            <a:schemeClr val="accent1"/>
+          </a:effectRef>
+          <a:fontRef idx="minor">
+            <a:schemeClr val="lt1"/>
+          </a:fontRef>
+        </p:style>
+        <p:txBody>
+          <a:bodyPr rot="0" spcFirstLastPara="0" vertOverflow="overflow" horzOverflow="overflow" vert="horz" wrap="square" lIns="45720" tIns="45720" rIns="45720" bIns="45720" numCol="1" spcCol="0" rtlCol="0" fromWordArt="0" anchor="ctr" anchorCtr="0" forceAA="0" compatLnSpc="1">
+            <a:prstTxWarp prst="textNoShape">
+              <a:avLst/>
+            </a:prstTxWarp>
+            <a:noAutofit/>
+          </a:bodyPr>
+          <a:lstStyle/>
+          <a:p>
+            <a:pPr algn="ctr">
+              <a:lnSpc>
+                <a:spcPct val="90000"/>
+              </a:lnSpc>
+            </a:pPr>
+            <a:r>
+              <a:rPr lang="en-US" dirty="0">
+                <a:solidFill>
+                  <a:schemeClr val="tx1"/>
+                </a:solidFill>
+              </a:rPr>
+              <a:t>Trainer</a:t>
+            </a:r>
+          </a:p>
+        </p:txBody>
+      </p:sp>
+      <p:sp>
+        <p:nvSpPr>
+          <p:cNvPr id="5" name="Rectangle 4">
+            <a:extLst>
+              <a:ext uri="{FF2B5EF4-FFF2-40B4-BE49-F238E27FC236}">
+                <a16:creationId xmlns:a16="http://schemas.microsoft.com/office/drawing/2014/main" id="{10BD7E34-D7E3-F54D-A21A-6A68F875D90A}"/>
+              </a:ext>
+            </a:extLst>
+          </p:cNvPr>
+          <p:cNvSpPr/>
+          <p:nvPr/>
+        </p:nvSpPr>
+        <p:spPr>
+          <a:xfrm>
+            <a:off x="639028" y="4180655"/>
+            <a:ext cx="2167233" cy="472965"/>
+          </a:xfrm>
+          <a:prstGeom prst="rect">
+            <a:avLst/>
+          </a:prstGeom>
+          <a:solidFill>
+            <a:schemeClr val="bg2"/>
+          </a:solidFill>
+          <a:ln>
+            <a:solidFill>
+              <a:schemeClr val="accent1"/>
+            </a:solidFill>
+          </a:ln>
+          <a:effectLst/>
+          <a:scene3d>
+            <a:camera prst="orthographicFront">
+              <a:rot lat="0" lon="0" rev="0"/>
+            </a:camera>
+            <a:lightRig rig="threePt" dir="t">
+              <a:rot lat="0" lon="0" rev="1200000"/>
+            </a:lightRig>
+          </a:scene3d>
+          <a:sp3d/>
+        </p:spPr>
+        <p:style>
+          <a:lnRef idx="0">
+            <a:schemeClr val="accent1"/>
+          </a:lnRef>
+          <a:fillRef idx="3">
+            <a:schemeClr val="accent1"/>
+          </a:fillRef>
+          <a:effectRef idx="3">
+            <a:schemeClr val="accent1"/>
+          </a:effectRef>
+          <a:fontRef idx="minor">
+            <a:schemeClr val="lt1"/>
+          </a:fontRef>
+        </p:style>
+        <p:txBody>
+          <a:bodyPr rot="0" spcFirstLastPara="0" vertOverflow="overflow" horzOverflow="overflow" vert="horz" wrap="square" lIns="45720" tIns="45720" rIns="45720" bIns="45720" numCol="1" spcCol="0" rtlCol="0" fromWordArt="0" anchor="ctr" anchorCtr="0" forceAA="0" compatLnSpc="1">
+            <a:prstTxWarp prst="textNoShape">
+              <a:avLst/>
+            </a:prstTxWarp>
+            <a:noAutofit/>
+          </a:bodyPr>
+          <a:lstStyle/>
+          <a:p>
+            <a:pPr algn="ctr">
+              <a:lnSpc>
+                <a:spcPct val="90000"/>
+              </a:lnSpc>
+            </a:pPr>
+            <a:r>
+              <a:rPr lang="en-US" dirty="0">
+                <a:solidFill>
+                  <a:schemeClr val="tx1"/>
+                </a:solidFill>
+              </a:rPr>
+              <a:t>Trainer</a:t>
+            </a:r>
+          </a:p>
+        </p:txBody>
+      </p:sp>
+      <p:sp>
+        <p:nvSpPr>
+          <p:cNvPr id="6" name="Rectangle 5">
+            <a:extLst>
+              <a:ext uri="{FF2B5EF4-FFF2-40B4-BE49-F238E27FC236}">
+                <a16:creationId xmlns:a16="http://schemas.microsoft.com/office/drawing/2014/main" id="{2D806F4D-D059-3145-B20F-472D76A92455}"/>
+              </a:ext>
+            </a:extLst>
+          </p:cNvPr>
+          <p:cNvSpPr/>
+          <p:nvPr/>
+        </p:nvSpPr>
+        <p:spPr>
+          <a:xfrm>
+            <a:off x="639027" y="4840345"/>
+            <a:ext cx="2167233" cy="472965"/>
+          </a:xfrm>
+          <a:prstGeom prst="rect">
+            <a:avLst/>
+          </a:prstGeom>
+          <a:solidFill>
+            <a:schemeClr val="bg2"/>
+          </a:solidFill>
+          <a:ln>
+            <a:solidFill>
+              <a:schemeClr val="accent1"/>
+            </a:solidFill>
+          </a:ln>
+          <a:effectLst/>
+          <a:scene3d>
+            <a:camera prst="orthographicFront">
+              <a:rot lat="0" lon="0" rev="0"/>
+            </a:camera>
+            <a:lightRig rig="threePt" dir="t">
+              <a:rot lat="0" lon="0" rev="1200000"/>
+            </a:lightRig>
+          </a:scene3d>
+          <a:sp3d/>
+        </p:spPr>
+        <p:style>
+          <a:lnRef idx="0">
+            <a:schemeClr val="accent1"/>
+          </a:lnRef>
+          <a:fillRef idx="3">
+            <a:schemeClr val="accent1"/>
+          </a:fillRef>
+          <a:effectRef idx="3">
+            <a:schemeClr val="accent1"/>
+          </a:effectRef>
+          <a:fontRef idx="minor">
+            <a:schemeClr val="lt1"/>
+          </a:fontRef>
+        </p:style>
+        <p:txBody>
+          <a:bodyPr rot="0" spcFirstLastPara="0" vertOverflow="overflow" horzOverflow="overflow" vert="horz" wrap="square" lIns="45720" tIns="45720" rIns="45720" bIns="45720" numCol="1" spcCol="0" rtlCol="0" fromWordArt="0" anchor="ctr" anchorCtr="0" forceAA="0" compatLnSpc="1">
+            <a:prstTxWarp prst="textNoShape">
+              <a:avLst/>
+            </a:prstTxWarp>
+            <a:noAutofit/>
+          </a:bodyPr>
+          <a:lstStyle/>
+          <a:p>
+            <a:pPr algn="ctr">
+              <a:lnSpc>
+                <a:spcPct val="90000"/>
+              </a:lnSpc>
+            </a:pPr>
+            <a:r>
+              <a:rPr lang="en-US" dirty="0">
+                <a:solidFill>
+                  <a:schemeClr val="tx1"/>
+                </a:solidFill>
+              </a:rPr>
+              <a:t>Trainer</a:t>
+            </a:r>
+          </a:p>
+        </p:txBody>
+      </p:sp>
+      <p:sp>
+        <p:nvSpPr>
+          <p:cNvPr id="7" name="Rectangle 6">
+            <a:extLst>
+              <a:ext uri="{FF2B5EF4-FFF2-40B4-BE49-F238E27FC236}">
+                <a16:creationId xmlns:a16="http://schemas.microsoft.com/office/drawing/2014/main" id="{8652DDDD-E150-334D-8922-95A1BA0D211F}"/>
+              </a:ext>
+            </a:extLst>
+          </p:cNvPr>
+          <p:cNvSpPr/>
+          <p:nvPr/>
+        </p:nvSpPr>
+        <p:spPr>
+          <a:xfrm>
+            <a:off x="639026" y="5500035"/>
+            <a:ext cx="2167233" cy="472965"/>
+          </a:xfrm>
+          <a:prstGeom prst="rect">
+            <a:avLst/>
+          </a:prstGeom>
+          <a:solidFill>
+            <a:schemeClr val="bg2"/>
+          </a:solidFill>
+          <a:ln>
+            <a:solidFill>
+              <a:schemeClr val="accent1"/>
+            </a:solidFill>
+          </a:ln>
+          <a:effectLst/>
+          <a:scene3d>
+            <a:camera prst="orthographicFront">
+              <a:rot lat="0" lon="0" rev="0"/>
+            </a:camera>
+            <a:lightRig rig="threePt" dir="t">
+              <a:rot lat="0" lon="0" rev="1200000"/>
+            </a:lightRig>
+          </a:scene3d>
+          <a:sp3d/>
+        </p:spPr>
+        <p:style>
+          <a:lnRef idx="0">
+            <a:schemeClr val="accent1"/>
+          </a:lnRef>
+          <a:fillRef idx="3">
+            <a:schemeClr val="accent1"/>
+          </a:fillRef>
+          <a:effectRef idx="3">
+            <a:schemeClr val="accent1"/>
+          </a:effectRef>
+          <a:fontRef idx="minor">
+            <a:schemeClr val="lt1"/>
+          </a:fontRef>
+        </p:style>
+        <p:txBody>
+          <a:bodyPr rot="0" spcFirstLastPara="0" vertOverflow="overflow" horzOverflow="overflow" vert="horz" wrap="square" lIns="45720" tIns="45720" rIns="45720" bIns="45720" numCol="1" spcCol="0" rtlCol="0" fromWordArt="0" anchor="ctr" anchorCtr="0" forceAA="0" compatLnSpc="1">
+            <a:prstTxWarp prst="textNoShape">
+              <a:avLst/>
+            </a:prstTxWarp>
+            <a:noAutofit/>
+          </a:bodyPr>
+          <a:lstStyle/>
+          <a:p>
+            <a:pPr algn="ctr">
+              <a:lnSpc>
+                <a:spcPct val="90000"/>
+              </a:lnSpc>
+            </a:pPr>
+            <a:r>
+              <a:rPr lang="en-US" dirty="0">
+                <a:solidFill>
+                  <a:schemeClr val="tx1"/>
+                </a:solidFill>
+              </a:rPr>
+              <a:t>Datastore</a:t>
+            </a:r>
+          </a:p>
+        </p:txBody>
+      </p:sp>
+      <p:sp>
+        <p:nvSpPr>
+          <p:cNvPr id="8" name="Rectangle 7">
+            <a:extLst>
+              <a:ext uri="{FF2B5EF4-FFF2-40B4-BE49-F238E27FC236}">
+                <a16:creationId xmlns:a16="http://schemas.microsoft.com/office/drawing/2014/main" id="{2A26DC80-8926-ED44-9B91-993FB1A8620E}"/>
+              </a:ext>
+            </a:extLst>
+          </p:cNvPr>
+          <p:cNvSpPr/>
+          <p:nvPr/>
+        </p:nvSpPr>
+        <p:spPr>
+          <a:xfrm>
+            <a:off x="2995448" y="3520965"/>
+            <a:ext cx="1145628" cy="472965"/>
+          </a:xfrm>
+          <a:prstGeom prst="rect">
+            <a:avLst/>
+          </a:prstGeom>
+          <a:solidFill>
+            <a:schemeClr val="bg2"/>
+          </a:solidFill>
+          <a:ln>
+            <a:solidFill>
+              <a:schemeClr val="accent4"/>
+            </a:solidFill>
+          </a:ln>
+          <a:effectLst/>
+          <a:scene3d>
+            <a:camera prst="orthographicFront">
+              <a:rot lat="0" lon="0" rev="0"/>
+            </a:camera>
+            <a:lightRig rig="threePt" dir="t">
+              <a:rot lat="0" lon="0" rev="1200000"/>
+            </a:lightRig>
+          </a:scene3d>
+          <a:sp3d/>
+        </p:spPr>
+        <p:style>
+          <a:lnRef idx="0">
+            <a:schemeClr val="accent1"/>
+          </a:lnRef>
+          <a:fillRef idx="3">
+            <a:schemeClr val="accent1"/>
+          </a:fillRef>
+          <a:effectRef idx="3">
+            <a:schemeClr val="accent1"/>
+          </a:effectRef>
+          <a:fontRef idx="minor">
+            <a:schemeClr val="lt1"/>
+          </a:fontRef>
+        </p:style>
+        <p:txBody>
+          <a:bodyPr rot="0" spcFirstLastPara="0" vertOverflow="overflow" horzOverflow="overflow" vert="horz" wrap="square" lIns="45720" tIns="45720" rIns="45720" bIns="45720" numCol="1" spcCol="0" rtlCol="0" fromWordArt="0" anchor="ctr" anchorCtr="0" forceAA="0" compatLnSpc="1">
+            <a:prstTxWarp prst="textNoShape">
+              <a:avLst/>
+            </a:prstTxWarp>
+            <a:noAutofit/>
+          </a:bodyPr>
+          <a:lstStyle/>
+          <a:p>
+            <a:pPr algn="ctr">
+              <a:lnSpc>
+                <a:spcPct val="90000"/>
+              </a:lnSpc>
+            </a:pPr>
+            <a:r>
+              <a:rPr lang="en-US" dirty="0">
+                <a:solidFill>
+                  <a:schemeClr val="tx1"/>
+                </a:solidFill>
+              </a:rPr>
+              <a:t>Model</a:t>
+            </a:r>
+          </a:p>
+        </p:txBody>
+      </p:sp>
+      <p:sp>
+        <p:nvSpPr>
+          <p:cNvPr id="9" name="Rectangle 8">
+            <a:extLst>
+              <a:ext uri="{FF2B5EF4-FFF2-40B4-BE49-F238E27FC236}">
+                <a16:creationId xmlns:a16="http://schemas.microsoft.com/office/drawing/2014/main" id="{9E196864-13EC-EF48-8E1B-B435F1004630}"/>
+              </a:ext>
+            </a:extLst>
+          </p:cNvPr>
+          <p:cNvSpPr/>
+          <p:nvPr/>
+        </p:nvSpPr>
+        <p:spPr>
+          <a:xfrm>
+            <a:off x="2995447" y="4180654"/>
+            <a:ext cx="2028497" cy="472965"/>
+          </a:xfrm>
+          <a:prstGeom prst="rect">
+            <a:avLst/>
+          </a:prstGeom>
+          <a:solidFill>
+            <a:schemeClr val="bg2"/>
+          </a:solidFill>
+          <a:ln>
+            <a:solidFill>
+              <a:schemeClr val="accent4"/>
+            </a:solidFill>
+          </a:ln>
+          <a:effectLst/>
+          <a:scene3d>
+            <a:camera prst="orthographicFront">
+              <a:rot lat="0" lon="0" rev="0"/>
+            </a:camera>
+            <a:lightRig rig="threePt" dir="t">
+              <a:rot lat="0" lon="0" rev="1200000"/>
+            </a:lightRig>
+          </a:scene3d>
+          <a:sp3d/>
+        </p:spPr>
+        <p:style>
+          <a:lnRef idx="0">
+            <a:schemeClr val="accent1"/>
+          </a:lnRef>
+          <a:fillRef idx="3">
+            <a:schemeClr val="accent1"/>
+          </a:fillRef>
+          <a:effectRef idx="3">
+            <a:schemeClr val="accent1"/>
+          </a:effectRef>
+          <a:fontRef idx="minor">
+            <a:schemeClr val="lt1"/>
+          </a:fontRef>
+        </p:style>
+        <p:txBody>
+          <a:bodyPr rot="0" spcFirstLastPara="0" vertOverflow="overflow" horzOverflow="overflow" vert="horz" wrap="square" lIns="45720" tIns="45720" rIns="45720" bIns="45720" numCol="1" spcCol="0" rtlCol="0" fromWordArt="0" anchor="ctr" anchorCtr="0" forceAA="0" compatLnSpc="1">
+            <a:prstTxWarp prst="textNoShape">
+              <a:avLst/>
+            </a:prstTxWarp>
+            <a:noAutofit/>
+          </a:bodyPr>
+          <a:lstStyle/>
+          <a:p>
+            <a:pPr algn="ctr">
+              <a:lnSpc>
+                <a:spcPct val="90000"/>
+              </a:lnSpc>
+            </a:pPr>
+            <a:r>
+              <a:rPr lang="en-US" dirty="0">
+                <a:solidFill>
+                  <a:schemeClr val="tx1"/>
+                </a:solidFill>
+              </a:rPr>
+              <a:t>Model</a:t>
+            </a:r>
+          </a:p>
+        </p:txBody>
+      </p:sp>
+      <p:sp>
+        <p:nvSpPr>
+          <p:cNvPr id="10" name="Rectangle 9">
+            <a:extLst>
+              <a:ext uri="{FF2B5EF4-FFF2-40B4-BE49-F238E27FC236}">
+                <a16:creationId xmlns:a16="http://schemas.microsoft.com/office/drawing/2014/main" id="{E20B9BFB-25B2-8441-A570-219D9E456FA5}"/>
+              </a:ext>
+            </a:extLst>
+          </p:cNvPr>
+          <p:cNvSpPr/>
+          <p:nvPr/>
+        </p:nvSpPr>
+        <p:spPr>
+          <a:xfrm>
+            <a:off x="2995447" y="4840345"/>
+            <a:ext cx="1545021" cy="472965"/>
+          </a:xfrm>
+          <a:prstGeom prst="rect">
+            <a:avLst/>
+          </a:prstGeom>
+          <a:solidFill>
+            <a:schemeClr val="bg2"/>
+          </a:solidFill>
+          <a:ln>
+            <a:solidFill>
+              <a:schemeClr val="accent4"/>
+            </a:solidFill>
+          </a:ln>
+          <a:effectLst/>
+          <a:scene3d>
+            <a:camera prst="orthographicFront">
+              <a:rot lat="0" lon="0" rev="0"/>
+            </a:camera>
+            <a:lightRig rig="threePt" dir="t">
+              <a:rot lat="0" lon="0" rev="1200000"/>
+            </a:lightRig>
+          </a:scene3d>
+          <a:sp3d/>
+        </p:spPr>
+        <p:style>
+          <a:lnRef idx="0">
+            <a:schemeClr val="accent1"/>
+          </a:lnRef>
+          <a:fillRef idx="3">
+            <a:schemeClr val="accent1"/>
+          </a:fillRef>
+          <a:effectRef idx="3">
+            <a:schemeClr val="accent1"/>
+          </a:effectRef>
+          <a:fontRef idx="minor">
+            <a:schemeClr val="lt1"/>
+          </a:fontRef>
+        </p:style>
+        <p:txBody>
+          <a:bodyPr rot="0" spcFirstLastPara="0" vertOverflow="overflow" horzOverflow="overflow" vert="horz" wrap="square" lIns="45720" tIns="45720" rIns="45720" bIns="45720" numCol="1" spcCol="0" rtlCol="0" fromWordArt="0" anchor="ctr" anchorCtr="0" forceAA="0" compatLnSpc="1">
+            <a:prstTxWarp prst="textNoShape">
+              <a:avLst/>
+            </a:prstTxWarp>
+            <a:noAutofit/>
+          </a:bodyPr>
+          <a:lstStyle/>
+          <a:p>
+            <a:pPr algn="ctr">
+              <a:lnSpc>
+                <a:spcPct val="90000"/>
+              </a:lnSpc>
+            </a:pPr>
+            <a:r>
+              <a:rPr lang="en-US" dirty="0">
+                <a:solidFill>
+                  <a:schemeClr val="tx1"/>
+                </a:solidFill>
+              </a:rPr>
+              <a:t>Model</a:t>
+            </a:r>
+          </a:p>
+        </p:txBody>
+      </p:sp>
+      <p:sp>
+        <p:nvSpPr>
+          <p:cNvPr id="11" name="Rectangle 10">
+            <a:extLst>
+              <a:ext uri="{FF2B5EF4-FFF2-40B4-BE49-F238E27FC236}">
+                <a16:creationId xmlns:a16="http://schemas.microsoft.com/office/drawing/2014/main" id="{FFB7FDC3-F255-DB42-B00B-538425EC1993}"/>
+              </a:ext>
+            </a:extLst>
+          </p:cNvPr>
+          <p:cNvSpPr/>
+          <p:nvPr/>
+        </p:nvSpPr>
+        <p:spPr>
+          <a:xfrm>
+            <a:off x="4330262" y="3520965"/>
+            <a:ext cx="2438400" cy="472965"/>
+          </a:xfrm>
+          <a:prstGeom prst="rect">
+            <a:avLst/>
+          </a:prstGeom>
+          <a:solidFill>
+            <a:schemeClr val="bg2"/>
+          </a:solidFill>
+          <a:ln>
+            <a:solidFill>
+              <a:schemeClr val="accent4"/>
+            </a:solidFill>
+          </a:ln>
+          <a:effectLst/>
+          <a:scene3d>
+            <a:camera prst="orthographicFront">
+              <a:rot lat="0" lon="0" rev="0"/>
+            </a:camera>
+            <a:lightRig rig="threePt" dir="t">
+              <a:rot lat="0" lon="0" rev="1200000"/>
+            </a:lightRig>
+          </a:scene3d>
+          <a:sp3d/>
+        </p:spPr>
+        <p:style>
+          <a:lnRef idx="0">
+            <a:schemeClr val="accent1"/>
+          </a:lnRef>
+          <a:fillRef idx="3">
+            <a:schemeClr val="accent1"/>
+          </a:fillRef>
+          <a:effectRef idx="3">
+            <a:schemeClr val="accent1"/>
+          </a:effectRef>
+          <a:fontRef idx="minor">
+            <a:schemeClr val="lt1"/>
+          </a:fontRef>
+        </p:style>
+        <p:txBody>
+          <a:bodyPr rot="0" spcFirstLastPara="0" vertOverflow="overflow" horzOverflow="overflow" vert="horz" wrap="square" lIns="45720" tIns="45720" rIns="45720" bIns="45720" numCol="1" spcCol="0" rtlCol="0" fromWordArt="0" anchor="ctr" anchorCtr="0" forceAA="0" compatLnSpc="1">
+            <a:prstTxWarp prst="textNoShape">
+              <a:avLst/>
+            </a:prstTxWarp>
+            <a:noAutofit/>
+          </a:bodyPr>
+          <a:lstStyle/>
+          <a:p>
+            <a:pPr algn="ctr">
+              <a:lnSpc>
+                <a:spcPct val="90000"/>
+              </a:lnSpc>
+            </a:pPr>
+            <a:r>
+              <a:rPr lang="en-US" dirty="0">
+                <a:solidFill>
+                  <a:schemeClr val="tx1"/>
+                </a:solidFill>
+              </a:rPr>
+              <a:t>Model</a:t>
+            </a:r>
+          </a:p>
+        </p:txBody>
+      </p:sp>
+      <p:sp>
+        <p:nvSpPr>
+          <p:cNvPr id="12" name="Rectangle 11">
+            <a:extLst>
+              <a:ext uri="{FF2B5EF4-FFF2-40B4-BE49-F238E27FC236}">
+                <a16:creationId xmlns:a16="http://schemas.microsoft.com/office/drawing/2014/main" id="{821CF8E5-F11E-8240-AB9F-C111673F93E7}"/>
+              </a:ext>
+            </a:extLst>
+          </p:cNvPr>
+          <p:cNvSpPr/>
+          <p:nvPr/>
+        </p:nvSpPr>
+        <p:spPr>
+          <a:xfrm>
+            <a:off x="5213130" y="4180654"/>
+            <a:ext cx="2830439" cy="472965"/>
+          </a:xfrm>
+          <a:prstGeom prst="rect">
+            <a:avLst/>
+          </a:prstGeom>
+          <a:solidFill>
+            <a:schemeClr val="bg2"/>
+          </a:solidFill>
+          <a:ln>
+            <a:solidFill>
+              <a:schemeClr val="accent4"/>
+            </a:solidFill>
+          </a:ln>
+          <a:effectLst/>
+          <a:scene3d>
+            <a:camera prst="orthographicFront">
+              <a:rot lat="0" lon="0" rev="0"/>
+            </a:camera>
+            <a:lightRig rig="threePt" dir="t">
+              <a:rot lat="0" lon="0" rev="1200000"/>
+            </a:lightRig>
+          </a:scene3d>
+          <a:sp3d/>
+        </p:spPr>
+        <p:style>
+          <a:lnRef idx="0">
+            <a:schemeClr val="accent1"/>
+          </a:lnRef>
+          <a:fillRef idx="3">
+            <a:schemeClr val="accent1"/>
+          </a:fillRef>
+          <a:effectRef idx="3">
+            <a:schemeClr val="accent1"/>
+          </a:effectRef>
+          <a:fontRef idx="minor">
+            <a:schemeClr val="lt1"/>
+          </a:fontRef>
+        </p:style>
+        <p:txBody>
+          <a:bodyPr rot="0" spcFirstLastPara="0" vertOverflow="overflow" horzOverflow="overflow" vert="horz" wrap="square" lIns="45720" tIns="45720" rIns="45720" bIns="45720" numCol="1" spcCol="0" rtlCol="0" fromWordArt="0" anchor="ctr" anchorCtr="0" forceAA="0" compatLnSpc="1">
+            <a:prstTxWarp prst="textNoShape">
+              <a:avLst/>
+            </a:prstTxWarp>
+            <a:noAutofit/>
+          </a:bodyPr>
+          <a:lstStyle/>
+          <a:p>
+            <a:pPr algn="ctr">
+              <a:lnSpc>
+                <a:spcPct val="90000"/>
+              </a:lnSpc>
+            </a:pPr>
+            <a:r>
+              <a:rPr lang="en-US" dirty="0">
+                <a:solidFill>
+                  <a:schemeClr val="tx1"/>
+                </a:solidFill>
+              </a:rPr>
+              <a:t>Model</a:t>
+            </a:r>
+          </a:p>
+        </p:txBody>
+      </p:sp>
+      <p:sp>
+        <p:nvSpPr>
+          <p:cNvPr id="13" name="Rectangle 12">
+            <a:extLst>
+              <a:ext uri="{FF2B5EF4-FFF2-40B4-BE49-F238E27FC236}">
+                <a16:creationId xmlns:a16="http://schemas.microsoft.com/office/drawing/2014/main" id="{3C31D93C-B673-8346-899B-149D08CF5305}"/>
+              </a:ext>
+            </a:extLst>
+          </p:cNvPr>
+          <p:cNvSpPr/>
+          <p:nvPr/>
+        </p:nvSpPr>
+        <p:spPr>
+          <a:xfrm>
+            <a:off x="4729655" y="4840345"/>
+            <a:ext cx="2039007" cy="472965"/>
+          </a:xfrm>
+          <a:prstGeom prst="rect">
+            <a:avLst/>
+          </a:prstGeom>
+          <a:solidFill>
+            <a:schemeClr val="bg2"/>
+          </a:solidFill>
+          <a:ln>
+            <a:solidFill>
+              <a:schemeClr val="accent4"/>
+            </a:solidFill>
+          </a:ln>
+          <a:effectLst/>
+          <a:scene3d>
+            <a:camera prst="orthographicFront">
+              <a:rot lat="0" lon="0" rev="0"/>
+            </a:camera>
+            <a:lightRig rig="threePt" dir="t">
+              <a:rot lat="0" lon="0" rev="1200000"/>
+            </a:lightRig>
+          </a:scene3d>
+          <a:sp3d/>
+        </p:spPr>
+        <p:style>
+          <a:lnRef idx="0">
+            <a:schemeClr val="accent1"/>
+          </a:lnRef>
+          <a:fillRef idx="3">
+            <a:schemeClr val="accent1"/>
+          </a:fillRef>
+          <a:effectRef idx="3">
+            <a:schemeClr val="accent1"/>
+          </a:effectRef>
+          <a:fontRef idx="minor">
+            <a:schemeClr val="lt1"/>
+          </a:fontRef>
+        </p:style>
+        <p:txBody>
+          <a:bodyPr rot="0" spcFirstLastPara="0" vertOverflow="overflow" horzOverflow="overflow" vert="horz" wrap="square" lIns="45720" tIns="45720" rIns="45720" bIns="45720" numCol="1" spcCol="0" rtlCol="0" fromWordArt="0" anchor="ctr" anchorCtr="0" forceAA="0" compatLnSpc="1">
+            <a:prstTxWarp prst="textNoShape">
+              <a:avLst/>
+            </a:prstTxWarp>
+            <a:noAutofit/>
+          </a:bodyPr>
+          <a:lstStyle/>
+          <a:p>
+            <a:pPr algn="ctr">
+              <a:lnSpc>
+                <a:spcPct val="90000"/>
+              </a:lnSpc>
+            </a:pPr>
+            <a:r>
+              <a:rPr lang="en-US" dirty="0">
+                <a:solidFill>
+                  <a:schemeClr val="tx1"/>
+                </a:solidFill>
+              </a:rPr>
+              <a:t>Model</a:t>
+            </a:r>
+          </a:p>
+        </p:txBody>
+      </p:sp>
+      <p:sp>
+        <p:nvSpPr>
+          <p:cNvPr id="14" name="Rectangle 13">
+            <a:extLst>
+              <a:ext uri="{FF2B5EF4-FFF2-40B4-BE49-F238E27FC236}">
+                <a16:creationId xmlns:a16="http://schemas.microsoft.com/office/drawing/2014/main" id="{01FDD7F0-BA10-9848-8C8A-BE0DEB9F3E14}"/>
+              </a:ext>
+            </a:extLst>
+          </p:cNvPr>
+          <p:cNvSpPr/>
+          <p:nvPr/>
+        </p:nvSpPr>
+        <p:spPr>
+          <a:xfrm>
+            <a:off x="6957847" y="3520965"/>
+            <a:ext cx="2782067" cy="472965"/>
+          </a:xfrm>
+          <a:prstGeom prst="rect">
+            <a:avLst/>
+          </a:prstGeom>
+          <a:solidFill>
+            <a:schemeClr val="bg2"/>
+          </a:solidFill>
+          <a:ln>
+            <a:solidFill>
+              <a:schemeClr val="accent4"/>
+            </a:solidFill>
+          </a:ln>
+          <a:effectLst/>
+          <a:scene3d>
+            <a:camera prst="orthographicFront">
+              <a:rot lat="0" lon="0" rev="0"/>
+            </a:camera>
+            <a:lightRig rig="threePt" dir="t">
+              <a:rot lat="0" lon="0" rev="1200000"/>
+            </a:lightRig>
+          </a:scene3d>
+          <a:sp3d/>
+        </p:spPr>
+        <p:style>
+          <a:lnRef idx="0">
+            <a:schemeClr val="accent1"/>
+          </a:lnRef>
+          <a:fillRef idx="3">
+            <a:schemeClr val="accent1"/>
+          </a:fillRef>
+          <a:effectRef idx="3">
+            <a:schemeClr val="accent1"/>
+          </a:effectRef>
+          <a:fontRef idx="minor">
+            <a:schemeClr val="lt1"/>
+          </a:fontRef>
+        </p:style>
+        <p:txBody>
+          <a:bodyPr rot="0" spcFirstLastPara="0" vertOverflow="overflow" horzOverflow="overflow" vert="horz" wrap="square" lIns="45720" tIns="45720" rIns="45720" bIns="45720" numCol="1" spcCol="0" rtlCol="0" fromWordArt="0" anchor="ctr" anchorCtr="0" forceAA="0" compatLnSpc="1">
+            <a:prstTxWarp prst="textNoShape">
+              <a:avLst/>
+            </a:prstTxWarp>
+            <a:noAutofit/>
+          </a:bodyPr>
+          <a:lstStyle/>
+          <a:p>
+            <a:pPr algn="ctr">
+              <a:lnSpc>
+                <a:spcPct val="90000"/>
+              </a:lnSpc>
+            </a:pPr>
+            <a:r>
+              <a:rPr lang="en-US" dirty="0">
+                <a:solidFill>
+                  <a:schemeClr val="tx1"/>
+                </a:solidFill>
+              </a:rPr>
+              <a:t>Model</a:t>
+            </a:r>
+          </a:p>
+        </p:txBody>
+      </p:sp>
+      <p:sp>
+        <p:nvSpPr>
+          <p:cNvPr id="15" name="Rectangle 14">
+            <a:extLst>
+              <a:ext uri="{FF2B5EF4-FFF2-40B4-BE49-F238E27FC236}">
+                <a16:creationId xmlns:a16="http://schemas.microsoft.com/office/drawing/2014/main" id="{CC87689C-FFE4-B246-9F3C-C09C7ED9087E}"/>
+              </a:ext>
+            </a:extLst>
+          </p:cNvPr>
+          <p:cNvSpPr/>
+          <p:nvPr/>
+        </p:nvSpPr>
+        <p:spPr>
+          <a:xfrm>
+            <a:off x="8232756" y="4180653"/>
+            <a:ext cx="2330142" cy="472965"/>
+          </a:xfrm>
+          <a:prstGeom prst="rect">
+            <a:avLst/>
+          </a:prstGeom>
+          <a:solidFill>
+            <a:schemeClr val="bg2"/>
+          </a:solidFill>
+          <a:ln>
+            <a:solidFill>
+              <a:schemeClr val="accent4"/>
+            </a:solidFill>
+          </a:ln>
+          <a:effectLst/>
+          <a:scene3d>
+            <a:camera prst="orthographicFront">
+              <a:rot lat="0" lon="0" rev="0"/>
+            </a:camera>
+            <a:lightRig rig="threePt" dir="t">
+              <a:rot lat="0" lon="0" rev="1200000"/>
+            </a:lightRig>
+          </a:scene3d>
+          <a:sp3d/>
+        </p:spPr>
+        <p:style>
+          <a:lnRef idx="0">
+            <a:schemeClr val="accent1"/>
+          </a:lnRef>
+          <a:fillRef idx="3">
+            <a:schemeClr val="accent1"/>
+          </a:fillRef>
+          <a:effectRef idx="3">
+            <a:schemeClr val="accent1"/>
+          </a:effectRef>
+          <a:fontRef idx="minor">
+            <a:schemeClr val="lt1"/>
+          </a:fontRef>
+        </p:style>
+        <p:txBody>
+          <a:bodyPr rot="0" spcFirstLastPara="0" vertOverflow="overflow" horzOverflow="overflow" vert="horz" wrap="square" lIns="45720" tIns="45720" rIns="45720" bIns="45720" numCol="1" spcCol="0" rtlCol="0" fromWordArt="0" anchor="ctr" anchorCtr="0" forceAA="0" compatLnSpc="1">
+            <a:prstTxWarp prst="textNoShape">
+              <a:avLst/>
+            </a:prstTxWarp>
+            <a:noAutofit/>
+          </a:bodyPr>
+          <a:lstStyle/>
+          <a:p>
+            <a:pPr algn="ctr">
+              <a:lnSpc>
+                <a:spcPct val="90000"/>
+              </a:lnSpc>
+            </a:pPr>
+            <a:r>
+              <a:rPr lang="en-US" dirty="0">
+                <a:solidFill>
+                  <a:schemeClr val="tx1"/>
+                </a:solidFill>
+              </a:rPr>
+              <a:t>Model</a:t>
+            </a:r>
+          </a:p>
+        </p:txBody>
+      </p:sp>
+      <p:sp>
+        <p:nvSpPr>
+          <p:cNvPr id="16" name="Rectangle 15">
+            <a:extLst>
+              <a:ext uri="{FF2B5EF4-FFF2-40B4-BE49-F238E27FC236}">
+                <a16:creationId xmlns:a16="http://schemas.microsoft.com/office/drawing/2014/main" id="{19456377-D0CC-534D-ADC3-F8525CB8F1DA}"/>
+              </a:ext>
+            </a:extLst>
+          </p:cNvPr>
+          <p:cNvSpPr/>
+          <p:nvPr/>
+        </p:nvSpPr>
+        <p:spPr>
+          <a:xfrm>
+            <a:off x="6957847" y="4853647"/>
+            <a:ext cx="2532994" cy="472965"/>
+          </a:xfrm>
+          <a:prstGeom prst="rect">
+            <a:avLst/>
+          </a:prstGeom>
+          <a:solidFill>
+            <a:schemeClr val="bg2"/>
+          </a:solidFill>
+          <a:ln>
+            <a:solidFill>
+              <a:schemeClr val="accent4"/>
+            </a:solidFill>
+          </a:ln>
+          <a:effectLst/>
+          <a:scene3d>
+            <a:camera prst="orthographicFront">
+              <a:rot lat="0" lon="0" rev="0"/>
+            </a:camera>
+            <a:lightRig rig="threePt" dir="t">
+              <a:rot lat="0" lon="0" rev="1200000"/>
+            </a:lightRig>
+          </a:scene3d>
+          <a:sp3d/>
+        </p:spPr>
+        <p:style>
+          <a:lnRef idx="0">
+            <a:schemeClr val="accent1"/>
+          </a:lnRef>
+          <a:fillRef idx="3">
+            <a:schemeClr val="accent1"/>
+          </a:fillRef>
+          <a:effectRef idx="3">
+            <a:schemeClr val="accent1"/>
+          </a:effectRef>
+          <a:fontRef idx="minor">
+            <a:schemeClr val="lt1"/>
+          </a:fontRef>
+        </p:style>
+        <p:txBody>
+          <a:bodyPr rot="0" spcFirstLastPara="0" vertOverflow="overflow" horzOverflow="overflow" vert="horz" wrap="square" lIns="45720" tIns="45720" rIns="45720" bIns="45720" numCol="1" spcCol="0" rtlCol="0" fromWordArt="0" anchor="ctr" anchorCtr="0" forceAA="0" compatLnSpc="1">
+            <a:prstTxWarp prst="textNoShape">
+              <a:avLst/>
+            </a:prstTxWarp>
+            <a:noAutofit/>
+          </a:bodyPr>
+          <a:lstStyle/>
+          <a:p>
+            <a:pPr algn="ctr">
+              <a:lnSpc>
+                <a:spcPct val="90000"/>
+              </a:lnSpc>
+            </a:pPr>
+            <a:r>
+              <a:rPr lang="en-US" dirty="0">
+                <a:solidFill>
+                  <a:schemeClr val="tx1"/>
+                </a:solidFill>
+              </a:rPr>
+              <a:t>Model</a:t>
+            </a:r>
+          </a:p>
+        </p:txBody>
+      </p:sp>
+    </p:spTree>
+    <p:extLst>
+      <p:ext uri="{BB962C8B-B14F-4D97-AF65-F5344CB8AC3E}">
+        <p14:creationId xmlns:p14="http://schemas.microsoft.com/office/powerpoint/2010/main" val="1370977561"/>
+      </p:ext>
+    </p:extLst>
+  </p:cSld>
+  <p:clrMapOvr>
+    <a:masterClrMapping/>
+  </p:clrMapOvr>
+</p:sld>
+</file>
+
+<file path=ppt/slides/slide5.xml><?xml version="1.0" encoding="utf-8"?>
+<p:sld xmlns:a="http://schemas.openxmlformats.org/drawingml/2006/main" xmlns:r="http://schemas.openxmlformats.org/officeDocument/2006/relationships" xmlns:p="http://schemas.openxmlformats.org/presentationml/2006/main">
+  <p:cSld>
+    <p:spTree>
+      <p:nvGrpSpPr>
+        <p:cNvPr id="1" name=""/>
+        <p:cNvGrpSpPr/>
+        <p:nvPr/>
+      </p:nvGrpSpPr>
+      <p:grpSpPr>
+        <a:xfrm>
+          <a:off x="0" y="0"/>
+          <a:ext cx="0" cy="0"/>
+          <a:chOff x="0" y="0"/>
+          <a:chExt cx="0" cy="0"/>
+        </a:xfrm>
+      </p:grpSpPr>
+      <p:sp>
+        <p:nvSpPr>
+          <p:cNvPr id="24" name="Rectangle 23">
+            <a:extLst>
+              <a:ext uri="{FF2B5EF4-FFF2-40B4-BE49-F238E27FC236}">
+                <a16:creationId xmlns:a16="http://schemas.microsoft.com/office/drawing/2014/main" id="{586EF878-903A-A442-8D15-9911413A6D99}"/>
+              </a:ext>
+            </a:extLst>
+          </p:cNvPr>
+          <p:cNvSpPr/>
+          <p:nvPr/>
+        </p:nvSpPr>
+        <p:spPr>
+          <a:xfrm>
+            <a:off x="2995443" y="5500035"/>
+            <a:ext cx="8518631" cy="472965"/>
+          </a:xfrm>
+          <a:prstGeom prst="rect">
+            <a:avLst/>
+          </a:prstGeom>
+          <a:solidFill>
+            <a:schemeClr val="bg2"/>
+          </a:solidFill>
+          <a:ln>
+            <a:solidFill>
+              <a:schemeClr val="accent1"/>
+            </a:solidFill>
+          </a:ln>
+          <a:effectLst/>
+          <a:scene3d>
+            <a:camera prst="orthographicFront">
+              <a:rot lat="0" lon="0" rev="0"/>
+            </a:camera>
+            <a:lightRig rig="threePt" dir="t">
+              <a:rot lat="0" lon="0" rev="1200000"/>
+            </a:lightRig>
+          </a:scene3d>
+          <a:sp3d/>
+        </p:spPr>
+        <p:style>
+          <a:lnRef idx="0">
+            <a:schemeClr val="accent1"/>
+          </a:lnRef>
+          <a:fillRef idx="3">
+            <a:schemeClr val="accent1"/>
+          </a:fillRef>
+          <a:effectRef idx="3">
+            <a:schemeClr val="accent1"/>
+          </a:effectRef>
+          <a:fontRef idx="minor">
+            <a:schemeClr val="lt1"/>
+          </a:fontRef>
+        </p:style>
+        <p:txBody>
+          <a:bodyPr rot="0" spcFirstLastPara="0" vertOverflow="overflow" horzOverflow="overflow" vert="horz" wrap="square" lIns="45720" tIns="45720" rIns="45720" bIns="45720" numCol="1" spcCol="0" rtlCol="0" fromWordArt="0" anchor="ctr" anchorCtr="0" forceAA="0" compatLnSpc="1">
+            <a:prstTxWarp prst="textNoShape">
+              <a:avLst/>
+            </a:prstTxWarp>
+            <a:noAutofit/>
+          </a:bodyPr>
+          <a:lstStyle/>
+          <a:p>
+            <a:pPr algn="ctr">
+              <a:lnSpc>
+                <a:spcPct val="90000"/>
+              </a:lnSpc>
+            </a:pPr>
+            <a:endParaRPr lang="en-US" dirty="0">
+              <a:solidFill>
+                <a:schemeClr val="tx1"/>
+              </a:solidFill>
+            </a:endParaRPr>
+          </a:p>
+        </p:txBody>
+      </p:sp>
+      <p:sp>
+        <p:nvSpPr>
+          <p:cNvPr id="2" name="Title 1">
+            <a:extLst>
+              <a:ext uri="{FF2B5EF4-FFF2-40B4-BE49-F238E27FC236}">
+                <a16:creationId xmlns:a16="http://schemas.microsoft.com/office/drawing/2014/main" id="{C0B271F8-6C8C-C04B-AED2-A5953EB635EC}"/>
+              </a:ext>
+            </a:extLst>
+          </p:cNvPr>
+          <p:cNvSpPr>
+            <a:spLocks noGrp="1"/>
+          </p:cNvSpPr>
+          <p:nvPr>
+            <p:ph type="title"/>
+          </p:nvPr>
+        </p:nvSpPr>
+        <p:spPr/>
+        <p:txBody>
+          <a:bodyPr/>
+          <a:lstStyle/>
+          <a:p>
+            <a:r>
+              <a:rPr lang="en-US" dirty="0"/>
+              <a:t>Population-based training</a:t>
+            </a:r>
+          </a:p>
+        </p:txBody>
+      </p:sp>
+      <p:sp>
+        <p:nvSpPr>
+          <p:cNvPr id="3" name="Content Placeholder 2">
+            <a:extLst>
+              <a:ext uri="{FF2B5EF4-FFF2-40B4-BE49-F238E27FC236}">
+                <a16:creationId xmlns:a16="http://schemas.microsoft.com/office/drawing/2014/main" id="{A020F716-F3EA-B34A-B98F-C7A42B685BA6}"/>
+              </a:ext>
+            </a:extLst>
+          </p:cNvPr>
+          <p:cNvSpPr>
+            <a:spLocks noGrp="1"/>
+          </p:cNvSpPr>
+          <p:nvPr>
+            <p:ph idx="1"/>
+          </p:nvPr>
+        </p:nvSpPr>
+        <p:spPr/>
+        <p:txBody>
+          <a:bodyPr/>
+          <a:lstStyle/>
+          <a:p>
+            <a:r>
+              <a:rPr lang="en-US" dirty="0"/>
+              <a:t>Asynchronous distributed optimization algorithm</a:t>
+            </a:r>
+          </a:p>
+          <a:p>
+            <a:pPr lvl="1"/>
+            <a:r>
+              <a:rPr lang="en-US" dirty="0"/>
+              <a:t>Train multiple models independently with different hyperparameters</a:t>
+            </a:r>
+          </a:p>
+          <a:p>
+            <a:pPr lvl="1"/>
+            <a:r>
+              <a:rPr lang="en-US" dirty="0"/>
+              <a:t>Periodically replace parameters and weights poorly performing models </a:t>
+            </a:r>
+          </a:p>
+        </p:txBody>
+      </p:sp>
+      <p:sp>
+        <p:nvSpPr>
+          <p:cNvPr id="4" name="Rectangle 3">
+            <a:extLst>
+              <a:ext uri="{FF2B5EF4-FFF2-40B4-BE49-F238E27FC236}">
+                <a16:creationId xmlns:a16="http://schemas.microsoft.com/office/drawing/2014/main" id="{7C9CD55E-0CEA-EB47-A9A3-174366096C6D}"/>
+              </a:ext>
+            </a:extLst>
+          </p:cNvPr>
+          <p:cNvSpPr/>
+          <p:nvPr/>
+        </p:nvSpPr>
+        <p:spPr>
+          <a:xfrm>
+            <a:off x="639029" y="3520965"/>
+            <a:ext cx="2167233" cy="472965"/>
+          </a:xfrm>
+          <a:prstGeom prst="rect">
+            <a:avLst/>
+          </a:prstGeom>
+          <a:solidFill>
+            <a:schemeClr val="bg2"/>
+          </a:solidFill>
+          <a:ln>
+            <a:solidFill>
+              <a:schemeClr val="accent1"/>
+            </a:solidFill>
+          </a:ln>
+          <a:effectLst/>
+          <a:scene3d>
+            <a:camera prst="orthographicFront">
+              <a:rot lat="0" lon="0" rev="0"/>
+            </a:camera>
+            <a:lightRig rig="threePt" dir="t">
+              <a:rot lat="0" lon="0" rev="1200000"/>
+            </a:lightRig>
+          </a:scene3d>
+          <a:sp3d/>
+        </p:spPr>
+        <p:style>
+          <a:lnRef idx="0">
+            <a:schemeClr val="accent1"/>
+          </a:lnRef>
+          <a:fillRef idx="3">
+            <a:schemeClr val="accent1"/>
+          </a:fillRef>
+          <a:effectRef idx="3">
+            <a:schemeClr val="accent1"/>
+          </a:effectRef>
+          <a:fontRef idx="minor">
+            <a:schemeClr val="lt1"/>
+          </a:fontRef>
+        </p:style>
+        <p:txBody>
+          <a:bodyPr rot="0" spcFirstLastPara="0" vertOverflow="overflow" horzOverflow="overflow" vert="horz" wrap="square" lIns="45720" tIns="45720" rIns="45720" bIns="45720" numCol="1" spcCol="0" rtlCol="0" fromWordArt="0" anchor="ctr" anchorCtr="0" forceAA="0" compatLnSpc="1">
+            <a:prstTxWarp prst="textNoShape">
+              <a:avLst/>
+            </a:prstTxWarp>
+            <a:noAutofit/>
+          </a:bodyPr>
+          <a:lstStyle/>
+          <a:p>
+            <a:pPr algn="ctr">
+              <a:lnSpc>
+                <a:spcPct val="90000"/>
+              </a:lnSpc>
+            </a:pPr>
+            <a:r>
+              <a:rPr lang="en-US" dirty="0">
+                <a:solidFill>
+                  <a:schemeClr val="tx1"/>
+                </a:solidFill>
+              </a:rPr>
+              <a:t>Trainer</a:t>
+            </a:r>
+          </a:p>
+        </p:txBody>
+      </p:sp>
+      <p:sp>
+        <p:nvSpPr>
+          <p:cNvPr id="5" name="Rectangle 4">
+            <a:extLst>
+              <a:ext uri="{FF2B5EF4-FFF2-40B4-BE49-F238E27FC236}">
+                <a16:creationId xmlns:a16="http://schemas.microsoft.com/office/drawing/2014/main" id="{10BD7E34-D7E3-F54D-A21A-6A68F875D90A}"/>
+              </a:ext>
+            </a:extLst>
+          </p:cNvPr>
+          <p:cNvSpPr/>
+          <p:nvPr/>
+        </p:nvSpPr>
+        <p:spPr>
+          <a:xfrm>
+            <a:off x="639028" y="4180655"/>
+            <a:ext cx="2167233" cy="472965"/>
+          </a:xfrm>
+          <a:prstGeom prst="rect">
+            <a:avLst/>
+          </a:prstGeom>
+          <a:solidFill>
+            <a:schemeClr val="bg2"/>
+          </a:solidFill>
+          <a:ln>
+            <a:solidFill>
+              <a:schemeClr val="accent1"/>
+            </a:solidFill>
+          </a:ln>
+          <a:effectLst/>
+          <a:scene3d>
+            <a:camera prst="orthographicFront">
+              <a:rot lat="0" lon="0" rev="0"/>
+            </a:camera>
+            <a:lightRig rig="threePt" dir="t">
+              <a:rot lat="0" lon="0" rev="1200000"/>
+            </a:lightRig>
+          </a:scene3d>
+          <a:sp3d/>
+        </p:spPr>
+        <p:style>
+          <a:lnRef idx="0">
+            <a:schemeClr val="accent1"/>
+          </a:lnRef>
+          <a:fillRef idx="3">
+            <a:schemeClr val="accent1"/>
+          </a:fillRef>
+          <a:effectRef idx="3">
+            <a:schemeClr val="accent1"/>
+          </a:effectRef>
+          <a:fontRef idx="minor">
+            <a:schemeClr val="lt1"/>
+          </a:fontRef>
+        </p:style>
+        <p:txBody>
+          <a:bodyPr rot="0" spcFirstLastPara="0" vertOverflow="overflow" horzOverflow="overflow" vert="horz" wrap="square" lIns="45720" tIns="45720" rIns="45720" bIns="45720" numCol="1" spcCol="0" rtlCol="0" fromWordArt="0" anchor="ctr" anchorCtr="0" forceAA="0" compatLnSpc="1">
+            <a:prstTxWarp prst="textNoShape">
+              <a:avLst/>
+            </a:prstTxWarp>
+            <a:noAutofit/>
+          </a:bodyPr>
+          <a:lstStyle/>
+          <a:p>
+            <a:pPr algn="ctr">
+              <a:lnSpc>
+                <a:spcPct val="90000"/>
+              </a:lnSpc>
+            </a:pPr>
+            <a:r>
+              <a:rPr lang="en-US" dirty="0">
+                <a:solidFill>
+                  <a:schemeClr val="tx1"/>
+                </a:solidFill>
+              </a:rPr>
+              <a:t>Trainer</a:t>
+            </a:r>
+          </a:p>
+        </p:txBody>
+      </p:sp>
+      <p:sp>
+        <p:nvSpPr>
+          <p:cNvPr id="6" name="Rectangle 5">
+            <a:extLst>
+              <a:ext uri="{FF2B5EF4-FFF2-40B4-BE49-F238E27FC236}">
+                <a16:creationId xmlns:a16="http://schemas.microsoft.com/office/drawing/2014/main" id="{2D806F4D-D059-3145-B20F-472D76A92455}"/>
+              </a:ext>
+            </a:extLst>
+          </p:cNvPr>
+          <p:cNvSpPr/>
+          <p:nvPr/>
+        </p:nvSpPr>
+        <p:spPr>
+          <a:xfrm>
+            <a:off x="639027" y="4840345"/>
+            <a:ext cx="2167233" cy="472965"/>
+          </a:xfrm>
+          <a:prstGeom prst="rect">
+            <a:avLst/>
+          </a:prstGeom>
+          <a:solidFill>
+            <a:schemeClr val="bg2"/>
+          </a:solidFill>
+          <a:ln>
+            <a:solidFill>
+              <a:schemeClr val="accent1"/>
+            </a:solidFill>
+          </a:ln>
+          <a:effectLst/>
+          <a:scene3d>
+            <a:camera prst="orthographicFront">
+              <a:rot lat="0" lon="0" rev="0"/>
+            </a:camera>
+            <a:lightRig rig="threePt" dir="t">
+              <a:rot lat="0" lon="0" rev="1200000"/>
+            </a:lightRig>
+          </a:scene3d>
+          <a:sp3d/>
+        </p:spPr>
+        <p:style>
+          <a:lnRef idx="0">
+            <a:schemeClr val="accent1"/>
+          </a:lnRef>
+          <a:fillRef idx="3">
+            <a:schemeClr val="accent1"/>
+          </a:fillRef>
+          <a:effectRef idx="3">
+            <a:schemeClr val="accent1"/>
+          </a:effectRef>
+          <a:fontRef idx="minor">
+            <a:schemeClr val="lt1"/>
+          </a:fontRef>
+        </p:style>
+        <p:txBody>
+          <a:bodyPr rot="0" spcFirstLastPara="0" vertOverflow="overflow" horzOverflow="overflow" vert="horz" wrap="square" lIns="45720" tIns="45720" rIns="45720" bIns="45720" numCol="1" spcCol="0" rtlCol="0" fromWordArt="0" anchor="ctr" anchorCtr="0" forceAA="0" compatLnSpc="1">
+            <a:prstTxWarp prst="textNoShape">
+              <a:avLst/>
+            </a:prstTxWarp>
+            <a:noAutofit/>
+          </a:bodyPr>
+          <a:lstStyle/>
+          <a:p>
+            <a:pPr algn="ctr">
+              <a:lnSpc>
+                <a:spcPct val="90000"/>
+              </a:lnSpc>
+            </a:pPr>
+            <a:r>
+              <a:rPr lang="en-US" dirty="0">
+                <a:solidFill>
+                  <a:schemeClr val="tx1"/>
+                </a:solidFill>
+              </a:rPr>
+              <a:t>Trainer</a:t>
+            </a:r>
+          </a:p>
+        </p:txBody>
+      </p:sp>
+      <p:sp>
+        <p:nvSpPr>
+          <p:cNvPr id="7" name="Rectangle 6">
+            <a:extLst>
+              <a:ext uri="{FF2B5EF4-FFF2-40B4-BE49-F238E27FC236}">
+                <a16:creationId xmlns:a16="http://schemas.microsoft.com/office/drawing/2014/main" id="{8652DDDD-E150-334D-8922-95A1BA0D211F}"/>
+              </a:ext>
+            </a:extLst>
+          </p:cNvPr>
+          <p:cNvSpPr/>
+          <p:nvPr/>
+        </p:nvSpPr>
+        <p:spPr>
+          <a:xfrm>
+            <a:off x="639026" y="5500035"/>
+            <a:ext cx="2167233" cy="472965"/>
+          </a:xfrm>
+          <a:prstGeom prst="rect">
+            <a:avLst/>
+          </a:prstGeom>
+          <a:solidFill>
+            <a:schemeClr val="bg2"/>
+          </a:solidFill>
+          <a:ln>
+            <a:solidFill>
+              <a:schemeClr val="accent1"/>
+            </a:solidFill>
+          </a:ln>
+          <a:effectLst/>
+          <a:scene3d>
+            <a:camera prst="orthographicFront">
+              <a:rot lat="0" lon="0" rev="0"/>
+            </a:camera>
+            <a:lightRig rig="threePt" dir="t">
+              <a:rot lat="0" lon="0" rev="1200000"/>
+            </a:lightRig>
+          </a:scene3d>
+          <a:sp3d/>
+        </p:spPr>
+        <p:style>
+          <a:lnRef idx="0">
+            <a:schemeClr val="accent1"/>
+          </a:lnRef>
+          <a:fillRef idx="3">
+            <a:schemeClr val="accent1"/>
+          </a:fillRef>
+          <a:effectRef idx="3">
+            <a:schemeClr val="accent1"/>
+          </a:effectRef>
+          <a:fontRef idx="minor">
+            <a:schemeClr val="lt1"/>
+          </a:fontRef>
+        </p:style>
+        <p:txBody>
+          <a:bodyPr rot="0" spcFirstLastPara="0" vertOverflow="overflow" horzOverflow="overflow" vert="horz" wrap="square" lIns="45720" tIns="45720" rIns="45720" bIns="45720" numCol="1" spcCol="0" rtlCol="0" fromWordArt="0" anchor="ctr" anchorCtr="0" forceAA="0" compatLnSpc="1">
+            <a:prstTxWarp prst="textNoShape">
+              <a:avLst/>
+            </a:prstTxWarp>
+            <a:noAutofit/>
+          </a:bodyPr>
+          <a:lstStyle/>
+          <a:p>
+            <a:pPr algn="ctr">
+              <a:lnSpc>
+                <a:spcPct val="90000"/>
+              </a:lnSpc>
+            </a:pPr>
+            <a:r>
+              <a:rPr lang="en-US" dirty="0">
+                <a:solidFill>
+                  <a:schemeClr val="tx1"/>
+                </a:solidFill>
+              </a:rPr>
+              <a:t>Datastore</a:t>
+            </a:r>
+          </a:p>
+        </p:txBody>
+      </p:sp>
+      <p:sp>
+        <p:nvSpPr>
+          <p:cNvPr id="8" name="Rectangle 7">
+            <a:extLst>
+              <a:ext uri="{FF2B5EF4-FFF2-40B4-BE49-F238E27FC236}">
+                <a16:creationId xmlns:a16="http://schemas.microsoft.com/office/drawing/2014/main" id="{2A26DC80-8926-ED44-9B91-993FB1A8620E}"/>
+              </a:ext>
+            </a:extLst>
+          </p:cNvPr>
+          <p:cNvSpPr/>
+          <p:nvPr/>
+        </p:nvSpPr>
+        <p:spPr>
+          <a:xfrm>
+            <a:off x="2995448" y="3520965"/>
+            <a:ext cx="1145628" cy="472965"/>
+          </a:xfrm>
+          <a:prstGeom prst="rect">
+            <a:avLst/>
+          </a:prstGeom>
+          <a:solidFill>
+            <a:schemeClr val="bg2"/>
+          </a:solidFill>
+          <a:ln>
+            <a:solidFill>
+              <a:schemeClr val="accent4"/>
+            </a:solidFill>
+          </a:ln>
+          <a:effectLst/>
+          <a:scene3d>
+            <a:camera prst="orthographicFront">
+              <a:rot lat="0" lon="0" rev="0"/>
+            </a:camera>
+            <a:lightRig rig="threePt" dir="t">
+              <a:rot lat="0" lon="0" rev="1200000"/>
+            </a:lightRig>
+          </a:scene3d>
+          <a:sp3d/>
+        </p:spPr>
+        <p:style>
+          <a:lnRef idx="0">
+            <a:schemeClr val="accent1"/>
+          </a:lnRef>
+          <a:fillRef idx="3">
+            <a:schemeClr val="accent1"/>
+          </a:fillRef>
+          <a:effectRef idx="3">
+            <a:schemeClr val="accent1"/>
+          </a:effectRef>
+          <a:fontRef idx="minor">
+            <a:schemeClr val="lt1"/>
+          </a:fontRef>
+        </p:style>
+        <p:txBody>
+          <a:bodyPr rot="0" spcFirstLastPara="0" vertOverflow="overflow" horzOverflow="overflow" vert="horz" wrap="square" lIns="45720" tIns="45720" rIns="45720" bIns="45720" numCol="1" spcCol="0" rtlCol="0" fromWordArt="0" anchor="ctr" anchorCtr="0" forceAA="0" compatLnSpc="1">
+            <a:prstTxWarp prst="textNoShape">
+              <a:avLst/>
+            </a:prstTxWarp>
+            <a:noAutofit/>
+          </a:bodyPr>
+          <a:lstStyle/>
+          <a:p>
+            <a:pPr algn="ctr">
+              <a:lnSpc>
+                <a:spcPct val="90000"/>
+              </a:lnSpc>
+            </a:pPr>
+            <a:r>
+              <a:rPr lang="en-US" dirty="0">
+                <a:solidFill>
+                  <a:schemeClr val="tx1"/>
+                </a:solidFill>
+              </a:rPr>
+              <a:t>Model</a:t>
+            </a:r>
+          </a:p>
+        </p:txBody>
+      </p:sp>
+      <p:sp>
+        <p:nvSpPr>
+          <p:cNvPr id="9" name="Rectangle 8">
+            <a:extLst>
+              <a:ext uri="{FF2B5EF4-FFF2-40B4-BE49-F238E27FC236}">
+                <a16:creationId xmlns:a16="http://schemas.microsoft.com/office/drawing/2014/main" id="{9E196864-13EC-EF48-8E1B-B435F1004630}"/>
+              </a:ext>
+            </a:extLst>
+          </p:cNvPr>
+          <p:cNvSpPr/>
+          <p:nvPr/>
+        </p:nvSpPr>
+        <p:spPr>
+          <a:xfrm>
+            <a:off x="2995447" y="4180654"/>
+            <a:ext cx="2028497" cy="472965"/>
+          </a:xfrm>
+          <a:prstGeom prst="rect">
+            <a:avLst/>
+          </a:prstGeom>
+          <a:solidFill>
+            <a:schemeClr val="bg2"/>
+          </a:solidFill>
+          <a:ln>
+            <a:solidFill>
+              <a:schemeClr val="accent4"/>
+            </a:solidFill>
+          </a:ln>
+          <a:effectLst/>
+          <a:scene3d>
+            <a:camera prst="orthographicFront">
+              <a:rot lat="0" lon="0" rev="0"/>
+            </a:camera>
+            <a:lightRig rig="threePt" dir="t">
+              <a:rot lat="0" lon="0" rev="1200000"/>
+            </a:lightRig>
+          </a:scene3d>
+          <a:sp3d/>
+        </p:spPr>
+        <p:style>
+          <a:lnRef idx="0">
+            <a:schemeClr val="accent1"/>
+          </a:lnRef>
+          <a:fillRef idx="3">
+            <a:schemeClr val="accent1"/>
+          </a:fillRef>
+          <a:effectRef idx="3">
+            <a:schemeClr val="accent1"/>
+          </a:effectRef>
+          <a:fontRef idx="minor">
+            <a:schemeClr val="lt1"/>
+          </a:fontRef>
+        </p:style>
+        <p:txBody>
+          <a:bodyPr rot="0" spcFirstLastPara="0" vertOverflow="overflow" horzOverflow="overflow" vert="horz" wrap="square" lIns="45720" tIns="45720" rIns="45720" bIns="45720" numCol="1" spcCol="0" rtlCol="0" fromWordArt="0" anchor="ctr" anchorCtr="0" forceAA="0" compatLnSpc="1">
+            <a:prstTxWarp prst="textNoShape">
+              <a:avLst/>
+            </a:prstTxWarp>
+            <a:noAutofit/>
+          </a:bodyPr>
+          <a:lstStyle/>
+          <a:p>
+            <a:pPr algn="ctr">
+              <a:lnSpc>
+                <a:spcPct val="90000"/>
+              </a:lnSpc>
+            </a:pPr>
+            <a:r>
+              <a:rPr lang="en-US" dirty="0">
+                <a:solidFill>
+                  <a:schemeClr val="tx1"/>
+                </a:solidFill>
+              </a:rPr>
+              <a:t>Model</a:t>
+            </a:r>
+          </a:p>
+        </p:txBody>
+      </p:sp>
+      <p:sp>
+        <p:nvSpPr>
+          <p:cNvPr id="10" name="Rectangle 9">
+            <a:extLst>
+              <a:ext uri="{FF2B5EF4-FFF2-40B4-BE49-F238E27FC236}">
+                <a16:creationId xmlns:a16="http://schemas.microsoft.com/office/drawing/2014/main" id="{E20B9BFB-25B2-8441-A570-219D9E456FA5}"/>
+              </a:ext>
+            </a:extLst>
+          </p:cNvPr>
+          <p:cNvSpPr/>
+          <p:nvPr/>
+        </p:nvSpPr>
+        <p:spPr>
+          <a:xfrm>
+            <a:off x="2995447" y="4840345"/>
+            <a:ext cx="1545021" cy="472965"/>
+          </a:xfrm>
+          <a:prstGeom prst="rect">
+            <a:avLst/>
+          </a:prstGeom>
+          <a:solidFill>
+            <a:schemeClr val="bg2"/>
+          </a:solidFill>
+          <a:ln>
+            <a:solidFill>
+              <a:schemeClr val="accent4"/>
+            </a:solidFill>
+          </a:ln>
+          <a:effectLst/>
+          <a:scene3d>
+            <a:camera prst="orthographicFront">
+              <a:rot lat="0" lon="0" rev="0"/>
+            </a:camera>
+            <a:lightRig rig="threePt" dir="t">
+              <a:rot lat="0" lon="0" rev="1200000"/>
+            </a:lightRig>
+          </a:scene3d>
+          <a:sp3d/>
+        </p:spPr>
+        <p:style>
+          <a:lnRef idx="0">
+            <a:schemeClr val="accent1"/>
+          </a:lnRef>
+          <a:fillRef idx="3">
+            <a:schemeClr val="accent1"/>
+          </a:fillRef>
+          <a:effectRef idx="3">
+            <a:schemeClr val="accent1"/>
+          </a:effectRef>
+          <a:fontRef idx="minor">
+            <a:schemeClr val="lt1"/>
+          </a:fontRef>
+        </p:style>
+        <p:txBody>
+          <a:bodyPr rot="0" spcFirstLastPara="0" vertOverflow="overflow" horzOverflow="overflow" vert="horz" wrap="square" lIns="45720" tIns="45720" rIns="45720" bIns="45720" numCol="1" spcCol="0" rtlCol="0" fromWordArt="0" anchor="ctr" anchorCtr="0" forceAA="0" compatLnSpc="1">
+            <a:prstTxWarp prst="textNoShape">
+              <a:avLst/>
+            </a:prstTxWarp>
+            <a:noAutofit/>
+          </a:bodyPr>
+          <a:lstStyle/>
+          <a:p>
+            <a:pPr algn="ctr">
+              <a:lnSpc>
+                <a:spcPct val="90000"/>
+              </a:lnSpc>
+            </a:pPr>
+            <a:r>
+              <a:rPr lang="en-US" dirty="0">
+                <a:solidFill>
+                  <a:schemeClr val="tx1"/>
+                </a:solidFill>
+              </a:rPr>
+              <a:t>Model</a:t>
+            </a:r>
+          </a:p>
+        </p:txBody>
+      </p:sp>
+      <p:sp>
+        <p:nvSpPr>
+          <p:cNvPr id="11" name="Rectangle 10">
+            <a:extLst>
+              <a:ext uri="{FF2B5EF4-FFF2-40B4-BE49-F238E27FC236}">
+                <a16:creationId xmlns:a16="http://schemas.microsoft.com/office/drawing/2014/main" id="{FFB7FDC3-F255-DB42-B00B-538425EC1993}"/>
+              </a:ext>
+            </a:extLst>
+          </p:cNvPr>
+          <p:cNvSpPr/>
+          <p:nvPr/>
+        </p:nvSpPr>
+        <p:spPr>
+          <a:xfrm>
+            <a:off x="4330262" y="3520965"/>
+            <a:ext cx="2438400" cy="472965"/>
+          </a:xfrm>
+          <a:prstGeom prst="rect">
+            <a:avLst/>
+          </a:prstGeom>
+          <a:solidFill>
+            <a:schemeClr val="bg2"/>
+          </a:solidFill>
+          <a:ln>
+            <a:solidFill>
+              <a:schemeClr val="accent4"/>
+            </a:solidFill>
+          </a:ln>
+          <a:effectLst/>
+          <a:scene3d>
+            <a:camera prst="orthographicFront">
+              <a:rot lat="0" lon="0" rev="0"/>
+            </a:camera>
+            <a:lightRig rig="threePt" dir="t">
+              <a:rot lat="0" lon="0" rev="1200000"/>
+            </a:lightRig>
+          </a:scene3d>
+          <a:sp3d/>
+        </p:spPr>
+        <p:style>
+          <a:lnRef idx="0">
+            <a:schemeClr val="accent1"/>
+          </a:lnRef>
+          <a:fillRef idx="3">
+            <a:schemeClr val="accent1"/>
+          </a:fillRef>
+          <a:effectRef idx="3">
+            <a:schemeClr val="accent1"/>
+          </a:effectRef>
+          <a:fontRef idx="minor">
+            <a:schemeClr val="lt1"/>
+          </a:fontRef>
+        </p:style>
+        <p:txBody>
+          <a:bodyPr rot="0" spcFirstLastPara="0" vertOverflow="overflow" horzOverflow="overflow" vert="horz" wrap="square" lIns="45720" tIns="45720" rIns="45720" bIns="45720" numCol="1" spcCol="0" rtlCol="0" fromWordArt="0" anchor="ctr" anchorCtr="0" forceAA="0" compatLnSpc="1">
+            <a:prstTxWarp prst="textNoShape">
+              <a:avLst/>
+            </a:prstTxWarp>
+            <a:noAutofit/>
+          </a:bodyPr>
+          <a:lstStyle/>
+          <a:p>
+            <a:pPr algn="ctr">
+              <a:lnSpc>
+                <a:spcPct val="90000"/>
+              </a:lnSpc>
+            </a:pPr>
+            <a:r>
+              <a:rPr lang="en-US" dirty="0">
+                <a:solidFill>
+                  <a:schemeClr val="tx1"/>
+                </a:solidFill>
+              </a:rPr>
+              <a:t>Model</a:t>
+            </a:r>
+          </a:p>
+        </p:txBody>
+      </p:sp>
+      <p:sp>
+        <p:nvSpPr>
+          <p:cNvPr id="12" name="Rectangle 11">
+            <a:extLst>
+              <a:ext uri="{FF2B5EF4-FFF2-40B4-BE49-F238E27FC236}">
+                <a16:creationId xmlns:a16="http://schemas.microsoft.com/office/drawing/2014/main" id="{821CF8E5-F11E-8240-AB9F-C111673F93E7}"/>
+              </a:ext>
+            </a:extLst>
+          </p:cNvPr>
+          <p:cNvSpPr/>
+          <p:nvPr/>
+        </p:nvSpPr>
+        <p:spPr>
+          <a:xfrm>
+            <a:off x="5213130" y="4180654"/>
+            <a:ext cx="2830439" cy="472965"/>
+          </a:xfrm>
+          <a:prstGeom prst="rect">
+            <a:avLst/>
+          </a:prstGeom>
+          <a:solidFill>
+            <a:schemeClr val="bg2"/>
+          </a:solidFill>
+          <a:ln>
+            <a:solidFill>
+              <a:schemeClr val="accent4"/>
+            </a:solidFill>
+          </a:ln>
+          <a:effectLst/>
+          <a:scene3d>
+            <a:camera prst="orthographicFront">
+              <a:rot lat="0" lon="0" rev="0"/>
+            </a:camera>
+            <a:lightRig rig="threePt" dir="t">
+              <a:rot lat="0" lon="0" rev="1200000"/>
+            </a:lightRig>
+          </a:scene3d>
+          <a:sp3d/>
+        </p:spPr>
+        <p:style>
+          <a:lnRef idx="0">
+            <a:schemeClr val="accent1"/>
+          </a:lnRef>
+          <a:fillRef idx="3">
+            <a:schemeClr val="accent1"/>
+          </a:fillRef>
+          <a:effectRef idx="3">
+            <a:schemeClr val="accent1"/>
+          </a:effectRef>
+          <a:fontRef idx="minor">
+            <a:schemeClr val="lt1"/>
+          </a:fontRef>
+        </p:style>
+        <p:txBody>
+          <a:bodyPr rot="0" spcFirstLastPara="0" vertOverflow="overflow" horzOverflow="overflow" vert="horz" wrap="square" lIns="45720" tIns="45720" rIns="45720" bIns="45720" numCol="1" spcCol="0" rtlCol="0" fromWordArt="0" anchor="ctr" anchorCtr="0" forceAA="0" compatLnSpc="1">
+            <a:prstTxWarp prst="textNoShape">
+              <a:avLst/>
+            </a:prstTxWarp>
+            <a:noAutofit/>
+          </a:bodyPr>
+          <a:lstStyle/>
+          <a:p>
+            <a:pPr algn="ctr">
+              <a:lnSpc>
+                <a:spcPct val="90000"/>
+              </a:lnSpc>
+            </a:pPr>
+            <a:r>
+              <a:rPr lang="en-US" dirty="0">
+                <a:solidFill>
+                  <a:schemeClr val="tx1"/>
+                </a:solidFill>
+              </a:rPr>
+              <a:t>Model</a:t>
+            </a:r>
+          </a:p>
+        </p:txBody>
+      </p:sp>
+      <p:sp>
+        <p:nvSpPr>
+          <p:cNvPr id="13" name="Rectangle 12">
+            <a:extLst>
+              <a:ext uri="{FF2B5EF4-FFF2-40B4-BE49-F238E27FC236}">
+                <a16:creationId xmlns:a16="http://schemas.microsoft.com/office/drawing/2014/main" id="{3C31D93C-B673-8346-899B-149D08CF5305}"/>
+              </a:ext>
+            </a:extLst>
+          </p:cNvPr>
+          <p:cNvSpPr/>
+          <p:nvPr/>
+        </p:nvSpPr>
+        <p:spPr>
+          <a:xfrm>
+            <a:off x="4729655" y="4840345"/>
+            <a:ext cx="2039007" cy="472965"/>
+          </a:xfrm>
+          <a:prstGeom prst="rect">
+            <a:avLst/>
+          </a:prstGeom>
+          <a:solidFill>
+            <a:schemeClr val="bg2"/>
+          </a:solidFill>
+          <a:ln>
+            <a:solidFill>
+              <a:schemeClr val="accent4"/>
+            </a:solidFill>
+          </a:ln>
+          <a:effectLst/>
+          <a:scene3d>
+            <a:camera prst="orthographicFront">
+              <a:rot lat="0" lon="0" rev="0"/>
+            </a:camera>
+            <a:lightRig rig="threePt" dir="t">
+              <a:rot lat="0" lon="0" rev="1200000"/>
+            </a:lightRig>
+          </a:scene3d>
+          <a:sp3d/>
+        </p:spPr>
+        <p:style>
+          <a:lnRef idx="0">
+            <a:schemeClr val="accent1"/>
+          </a:lnRef>
+          <a:fillRef idx="3">
+            <a:schemeClr val="accent1"/>
+          </a:fillRef>
+          <a:effectRef idx="3">
+            <a:schemeClr val="accent1"/>
+          </a:effectRef>
+          <a:fontRef idx="minor">
+            <a:schemeClr val="lt1"/>
+          </a:fontRef>
+        </p:style>
+        <p:txBody>
+          <a:bodyPr rot="0" spcFirstLastPara="0" vertOverflow="overflow" horzOverflow="overflow" vert="horz" wrap="square" lIns="45720" tIns="45720" rIns="45720" bIns="45720" numCol="1" spcCol="0" rtlCol="0" fromWordArt="0" anchor="ctr" anchorCtr="0" forceAA="0" compatLnSpc="1">
+            <a:prstTxWarp prst="textNoShape">
+              <a:avLst/>
+            </a:prstTxWarp>
+            <a:noAutofit/>
+          </a:bodyPr>
+          <a:lstStyle/>
+          <a:p>
+            <a:pPr algn="ctr">
+              <a:lnSpc>
+                <a:spcPct val="90000"/>
+              </a:lnSpc>
+            </a:pPr>
+            <a:r>
+              <a:rPr lang="en-US" dirty="0">
+                <a:solidFill>
+                  <a:schemeClr val="tx1"/>
+                </a:solidFill>
+              </a:rPr>
+              <a:t>Model</a:t>
+            </a:r>
+          </a:p>
+        </p:txBody>
+      </p:sp>
+      <p:sp>
+        <p:nvSpPr>
+          <p:cNvPr id="14" name="Rectangle 13">
+            <a:extLst>
+              <a:ext uri="{FF2B5EF4-FFF2-40B4-BE49-F238E27FC236}">
+                <a16:creationId xmlns:a16="http://schemas.microsoft.com/office/drawing/2014/main" id="{01FDD7F0-BA10-9848-8C8A-BE0DEB9F3E14}"/>
+              </a:ext>
+            </a:extLst>
+          </p:cNvPr>
+          <p:cNvSpPr/>
+          <p:nvPr/>
+        </p:nvSpPr>
+        <p:spPr>
+          <a:xfrm>
+            <a:off x="6957847" y="3520965"/>
+            <a:ext cx="2782067" cy="472965"/>
+          </a:xfrm>
+          <a:prstGeom prst="rect">
+            <a:avLst/>
+          </a:prstGeom>
+          <a:solidFill>
+            <a:schemeClr val="bg2"/>
+          </a:solidFill>
+          <a:ln>
+            <a:solidFill>
+              <a:schemeClr val="accent4"/>
+            </a:solidFill>
+          </a:ln>
+          <a:effectLst/>
+          <a:scene3d>
+            <a:camera prst="orthographicFront">
+              <a:rot lat="0" lon="0" rev="0"/>
+            </a:camera>
+            <a:lightRig rig="threePt" dir="t">
+              <a:rot lat="0" lon="0" rev="1200000"/>
+            </a:lightRig>
+          </a:scene3d>
+          <a:sp3d/>
+        </p:spPr>
+        <p:style>
+          <a:lnRef idx="0">
+            <a:schemeClr val="accent1"/>
+          </a:lnRef>
+          <a:fillRef idx="3">
+            <a:schemeClr val="accent1"/>
+          </a:fillRef>
+          <a:effectRef idx="3">
+            <a:schemeClr val="accent1"/>
+          </a:effectRef>
+          <a:fontRef idx="minor">
+            <a:schemeClr val="lt1"/>
+          </a:fontRef>
+        </p:style>
+        <p:txBody>
+          <a:bodyPr rot="0" spcFirstLastPara="0" vertOverflow="overflow" horzOverflow="overflow" vert="horz" wrap="square" lIns="45720" tIns="45720" rIns="45720" bIns="45720" numCol="1" spcCol="0" rtlCol="0" fromWordArt="0" anchor="ctr" anchorCtr="0" forceAA="0" compatLnSpc="1">
+            <a:prstTxWarp prst="textNoShape">
+              <a:avLst/>
+            </a:prstTxWarp>
+            <a:noAutofit/>
+          </a:bodyPr>
+          <a:lstStyle/>
+          <a:p>
+            <a:pPr algn="ctr">
+              <a:lnSpc>
+                <a:spcPct val="90000"/>
+              </a:lnSpc>
+            </a:pPr>
+            <a:r>
+              <a:rPr lang="en-US" dirty="0">
+                <a:solidFill>
+                  <a:schemeClr val="tx1"/>
+                </a:solidFill>
+              </a:rPr>
+              <a:t>Model</a:t>
+            </a:r>
+          </a:p>
+        </p:txBody>
+      </p:sp>
+      <p:sp>
+        <p:nvSpPr>
+          <p:cNvPr id="15" name="Rectangle 14">
+            <a:extLst>
+              <a:ext uri="{FF2B5EF4-FFF2-40B4-BE49-F238E27FC236}">
+                <a16:creationId xmlns:a16="http://schemas.microsoft.com/office/drawing/2014/main" id="{CC87689C-FFE4-B246-9F3C-C09C7ED9087E}"/>
+              </a:ext>
+            </a:extLst>
+          </p:cNvPr>
+          <p:cNvSpPr/>
+          <p:nvPr/>
+        </p:nvSpPr>
+        <p:spPr>
+          <a:xfrm>
+            <a:off x="8232756" y="4180653"/>
+            <a:ext cx="2330142" cy="472965"/>
+          </a:xfrm>
+          <a:prstGeom prst="rect">
+            <a:avLst/>
+          </a:prstGeom>
+          <a:solidFill>
+            <a:schemeClr val="bg2"/>
+          </a:solidFill>
+          <a:ln>
+            <a:solidFill>
+              <a:schemeClr val="accent4"/>
+            </a:solidFill>
+          </a:ln>
+          <a:effectLst/>
+          <a:scene3d>
+            <a:camera prst="orthographicFront">
+              <a:rot lat="0" lon="0" rev="0"/>
+            </a:camera>
+            <a:lightRig rig="threePt" dir="t">
+              <a:rot lat="0" lon="0" rev="1200000"/>
+            </a:lightRig>
+          </a:scene3d>
+          <a:sp3d/>
+        </p:spPr>
+        <p:style>
+          <a:lnRef idx="0">
+            <a:schemeClr val="accent1"/>
+          </a:lnRef>
+          <a:fillRef idx="3">
+            <a:schemeClr val="accent1"/>
+          </a:fillRef>
+          <a:effectRef idx="3">
+            <a:schemeClr val="accent1"/>
+          </a:effectRef>
+          <a:fontRef idx="minor">
+            <a:schemeClr val="lt1"/>
+          </a:fontRef>
+        </p:style>
+        <p:txBody>
+          <a:bodyPr rot="0" spcFirstLastPara="0" vertOverflow="overflow" horzOverflow="overflow" vert="horz" wrap="square" lIns="45720" tIns="45720" rIns="45720" bIns="45720" numCol="1" spcCol="0" rtlCol="0" fromWordArt="0" anchor="ctr" anchorCtr="0" forceAA="0" compatLnSpc="1">
+            <a:prstTxWarp prst="textNoShape">
+              <a:avLst/>
+            </a:prstTxWarp>
+            <a:noAutofit/>
+          </a:bodyPr>
+          <a:lstStyle/>
+          <a:p>
+            <a:pPr algn="ctr">
+              <a:lnSpc>
+                <a:spcPct val="90000"/>
+              </a:lnSpc>
+            </a:pPr>
+            <a:r>
+              <a:rPr lang="en-US" dirty="0">
+                <a:solidFill>
+                  <a:schemeClr val="tx1"/>
+                </a:solidFill>
+              </a:rPr>
+              <a:t>Model</a:t>
+            </a:r>
+          </a:p>
+        </p:txBody>
+      </p:sp>
+      <p:sp>
+        <p:nvSpPr>
+          <p:cNvPr id="16" name="Rectangle 15">
+            <a:extLst>
+              <a:ext uri="{FF2B5EF4-FFF2-40B4-BE49-F238E27FC236}">
+                <a16:creationId xmlns:a16="http://schemas.microsoft.com/office/drawing/2014/main" id="{19456377-D0CC-534D-ADC3-F8525CB8F1DA}"/>
+              </a:ext>
+            </a:extLst>
+          </p:cNvPr>
+          <p:cNvSpPr/>
+          <p:nvPr/>
+        </p:nvSpPr>
+        <p:spPr>
+          <a:xfrm>
+            <a:off x="6957847" y="4853647"/>
+            <a:ext cx="2532994" cy="472965"/>
+          </a:xfrm>
+          <a:prstGeom prst="rect">
+            <a:avLst/>
+          </a:prstGeom>
+          <a:solidFill>
+            <a:schemeClr val="bg2"/>
+          </a:solidFill>
+          <a:ln>
+            <a:solidFill>
+              <a:schemeClr val="accent4"/>
+            </a:solidFill>
+          </a:ln>
+          <a:effectLst/>
+          <a:scene3d>
+            <a:camera prst="orthographicFront">
+              <a:rot lat="0" lon="0" rev="0"/>
+            </a:camera>
+            <a:lightRig rig="threePt" dir="t">
+              <a:rot lat="0" lon="0" rev="1200000"/>
+            </a:lightRig>
+          </a:scene3d>
+          <a:sp3d/>
+        </p:spPr>
+        <p:style>
+          <a:lnRef idx="0">
+            <a:schemeClr val="accent1"/>
+          </a:lnRef>
+          <a:fillRef idx="3">
+            <a:schemeClr val="accent1"/>
+          </a:fillRef>
+          <a:effectRef idx="3">
+            <a:schemeClr val="accent1"/>
+          </a:effectRef>
+          <a:fontRef idx="minor">
+            <a:schemeClr val="lt1"/>
+          </a:fontRef>
+        </p:style>
+        <p:txBody>
+          <a:bodyPr rot="0" spcFirstLastPara="0" vertOverflow="overflow" horzOverflow="overflow" vert="horz" wrap="square" lIns="45720" tIns="45720" rIns="45720" bIns="45720" numCol="1" spcCol="0" rtlCol="0" fromWordArt="0" anchor="ctr" anchorCtr="0" forceAA="0" compatLnSpc="1">
+            <a:prstTxWarp prst="textNoShape">
+              <a:avLst/>
+            </a:prstTxWarp>
+            <a:noAutofit/>
+          </a:bodyPr>
+          <a:lstStyle/>
+          <a:p>
+            <a:pPr algn="ctr">
+              <a:lnSpc>
+                <a:spcPct val="90000"/>
+              </a:lnSpc>
+            </a:pPr>
+            <a:r>
+              <a:rPr lang="en-US" dirty="0">
+                <a:solidFill>
+                  <a:schemeClr val="tx1"/>
+                </a:solidFill>
+              </a:rPr>
+              <a:t>Model</a:t>
+            </a:r>
+          </a:p>
+        </p:txBody>
+      </p:sp>
+      <p:cxnSp>
+        <p:nvCxnSpPr>
+          <p:cNvPr id="18" name="Straight Arrow Connector 17">
+            <a:extLst>
+              <a:ext uri="{FF2B5EF4-FFF2-40B4-BE49-F238E27FC236}">
+                <a16:creationId xmlns:a16="http://schemas.microsoft.com/office/drawing/2014/main" id="{A9F70BEE-D221-F94C-9DBA-D17DFCB0CBEE}"/>
+              </a:ext>
+            </a:extLst>
+          </p:cNvPr>
+          <p:cNvCxnSpPr>
+            <a:cxnSpLocks/>
+          </p:cNvCxnSpPr>
+          <p:nvPr/>
+        </p:nvCxnSpPr>
+        <p:spPr>
+          <a:xfrm flipH="1">
+            <a:off x="4141076" y="3691758"/>
+            <a:ext cx="1" cy="2094518"/>
+          </a:xfrm>
+          <a:prstGeom prst="straightConnector1">
+            <a:avLst/>
+          </a:prstGeom>
+          <a:ln w="76200">
+            <a:tailEnd type="triangle"/>
+          </a:ln>
+        </p:spPr>
+        <p:style>
+          <a:lnRef idx="1">
+            <a:schemeClr val="accent1"/>
+          </a:lnRef>
+          <a:fillRef idx="0">
+            <a:schemeClr val="accent1"/>
+          </a:fillRef>
+          <a:effectRef idx="0">
+            <a:schemeClr val="accent1"/>
+          </a:effectRef>
+          <a:fontRef idx="minor">
+            <a:schemeClr val="tx1"/>
+          </a:fontRef>
+        </p:style>
+      </p:cxnSp>
+      <p:cxnSp>
+        <p:nvCxnSpPr>
+          <p:cNvPr id="19" name="Straight Arrow Connector 18">
+            <a:extLst>
+              <a:ext uri="{FF2B5EF4-FFF2-40B4-BE49-F238E27FC236}">
+                <a16:creationId xmlns:a16="http://schemas.microsoft.com/office/drawing/2014/main" id="{97778591-1EC2-F346-A95C-9EA31DED3846}"/>
+              </a:ext>
+            </a:extLst>
+          </p:cNvPr>
+          <p:cNvCxnSpPr>
+            <a:cxnSpLocks/>
+          </p:cNvCxnSpPr>
+          <p:nvPr/>
+        </p:nvCxnSpPr>
+        <p:spPr>
+          <a:xfrm flipH="1">
+            <a:off x="5023941" y="4401206"/>
+            <a:ext cx="5" cy="1385070"/>
+          </a:xfrm>
+          <a:prstGeom prst="straightConnector1">
+            <a:avLst/>
+          </a:prstGeom>
+          <a:ln w="76200">
+            <a:tailEnd type="triangle"/>
+          </a:ln>
+        </p:spPr>
+        <p:style>
+          <a:lnRef idx="1">
+            <a:schemeClr val="accent1"/>
+          </a:lnRef>
+          <a:fillRef idx="0">
+            <a:schemeClr val="accent1"/>
+          </a:fillRef>
+          <a:effectRef idx="0">
+            <a:schemeClr val="accent1"/>
+          </a:effectRef>
+          <a:fontRef idx="minor">
+            <a:schemeClr val="tx1"/>
+          </a:fontRef>
+        </p:style>
+      </p:cxnSp>
+      <p:cxnSp>
+        <p:nvCxnSpPr>
+          <p:cNvPr id="21" name="Straight Arrow Connector 20">
+            <a:extLst>
+              <a:ext uri="{FF2B5EF4-FFF2-40B4-BE49-F238E27FC236}">
+                <a16:creationId xmlns:a16="http://schemas.microsoft.com/office/drawing/2014/main" id="{23776186-4966-5840-86F3-A179CB4A5856}"/>
+              </a:ext>
+            </a:extLst>
+          </p:cNvPr>
+          <p:cNvCxnSpPr>
+            <a:cxnSpLocks/>
+          </p:cNvCxnSpPr>
+          <p:nvPr/>
+        </p:nvCxnSpPr>
+        <p:spPr>
+          <a:xfrm>
+            <a:off x="4535211" y="5077975"/>
+            <a:ext cx="5257" cy="708301"/>
+          </a:xfrm>
+          <a:prstGeom prst="straightConnector1">
+            <a:avLst/>
+          </a:prstGeom>
+          <a:ln w="76200">
+            <a:tailEnd type="triangle"/>
+          </a:ln>
+        </p:spPr>
+        <p:style>
+          <a:lnRef idx="1">
+            <a:schemeClr val="accent1"/>
+          </a:lnRef>
+          <a:fillRef idx="0">
+            <a:schemeClr val="accent1"/>
+          </a:fillRef>
+          <a:effectRef idx="0">
+            <a:schemeClr val="accent1"/>
+          </a:effectRef>
+          <a:fontRef idx="minor">
+            <a:schemeClr val="tx1"/>
+          </a:fontRef>
+        </p:style>
+      </p:cxnSp>
+      <p:cxnSp>
+        <p:nvCxnSpPr>
+          <p:cNvPr id="28" name="Straight Arrow Connector 27">
+            <a:extLst>
+              <a:ext uri="{FF2B5EF4-FFF2-40B4-BE49-F238E27FC236}">
+                <a16:creationId xmlns:a16="http://schemas.microsoft.com/office/drawing/2014/main" id="{9A8BBEA5-17AA-8A4C-8577-94F7AA36C499}"/>
+              </a:ext>
+            </a:extLst>
+          </p:cNvPr>
+          <p:cNvCxnSpPr>
+            <a:cxnSpLocks/>
+          </p:cNvCxnSpPr>
+          <p:nvPr/>
+        </p:nvCxnSpPr>
+        <p:spPr>
+          <a:xfrm flipH="1">
+            <a:off x="6750647" y="3699724"/>
+            <a:ext cx="1" cy="2094518"/>
+          </a:xfrm>
+          <a:prstGeom prst="straightConnector1">
+            <a:avLst/>
+          </a:prstGeom>
+          <a:ln w="76200">
+            <a:tailEnd type="triangle"/>
+          </a:ln>
+        </p:spPr>
+        <p:style>
+          <a:lnRef idx="1">
+            <a:schemeClr val="accent1"/>
+          </a:lnRef>
+          <a:fillRef idx="0">
+            <a:schemeClr val="accent1"/>
+          </a:fillRef>
+          <a:effectRef idx="0">
+            <a:schemeClr val="accent1"/>
+          </a:effectRef>
+          <a:fontRef idx="minor">
+            <a:schemeClr val="tx1"/>
+          </a:fontRef>
+        </p:style>
+      </p:cxnSp>
+      <p:cxnSp>
+        <p:nvCxnSpPr>
+          <p:cNvPr id="29" name="Straight Arrow Connector 28">
+            <a:extLst>
+              <a:ext uri="{FF2B5EF4-FFF2-40B4-BE49-F238E27FC236}">
+                <a16:creationId xmlns:a16="http://schemas.microsoft.com/office/drawing/2014/main" id="{29B523D6-725B-3643-ACA3-BDA5AE4C4D24}"/>
+              </a:ext>
+            </a:extLst>
+          </p:cNvPr>
+          <p:cNvCxnSpPr>
+            <a:cxnSpLocks/>
+          </p:cNvCxnSpPr>
+          <p:nvPr/>
+        </p:nvCxnSpPr>
+        <p:spPr>
+          <a:xfrm>
+            <a:off x="6653425" y="5075679"/>
+            <a:ext cx="5257" cy="708301"/>
+          </a:xfrm>
+          <a:prstGeom prst="straightConnector1">
+            <a:avLst/>
+          </a:prstGeom>
+          <a:ln w="76200">
+            <a:tailEnd type="triangle"/>
+          </a:ln>
+        </p:spPr>
+        <p:style>
+          <a:lnRef idx="1">
+            <a:schemeClr val="accent1"/>
+          </a:lnRef>
+          <a:fillRef idx="0">
+            <a:schemeClr val="accent1"/>
+          </a:fillRef>
+          <a:effectRef idx="0">
+            <a:schemeClr val="accent1"/>
+          </a:effectRef>
+          <a:fontRef idx="minor">
+            <a:schemeClr val="tx1"/>
+          </a:fontRef>
+        </p:style>
+      </p:cxnSp>
+      <p:cxnSp>
+        <p:nvCxnSpPr>
+          <p:cNvPr id="30" name="Straight Arrow Connector 29">
+            <a:extLst>
+              <a:ext uri="{FF2B5EF4-FFF2-40B4-BE49-F238E27FC236}">
+                <a16:creationId xmlns:a16="http://schemas.microsoft.com/office/drawing/2014/main" id="{31C65952-470B-3545-865E-D9A7FA7366FA}"/>
+              </a:ext>
+            </a:extLst>
+          </p:cNvPr>
+          <p:cNvCxnSpPr>
+            <a:cxnSpLocks/>
+          </p:cNvCxnSpPr>
+          <p:nvPr/>
+        </p:nvCxnSpPr>
+        <p:spPr>
+          <a:xfrm flipH="1">
+            <a:off x="8042515" y="4412785"/>
+            <a:ext cx="4803" cy="1381457"/>
+          </a:xfrm>
+          <a:prstGeom prst="straightConnector1">
+            <a:avLst/>
+          </a:prstGeom>
+          <a:ln w="76200">
+            <a:tailEnd type="triangle"/>
+          </a:ln>
+        </p:spPr>
+        <p:style>
+          <a:lnRef idx="1">
+            <a:schemeClr val="accent1"/>
+          </a:lnRef>
+          <a:fillRef idx="0">
+            <a:schemeClr val="accent1"/>
+          </a:fillRef>
+          <a:effectRef idx="0">
+            <a:schemeClr val="accent1"/>
+          </a:effectRef>
+          <a:fontRef idx="minor">
+            <a:schemeClr val="tx1"/>
+          </a:fontRef>
+        </p:style>
+      </p:cxnSp>
+      <p:cxnSp>
+        <p:nvCxnSpPr>
+          <p:cNvPr id="32" name="Straight Arrow Connector 31">
+            <a:extLst>
+              <a:ext uri="{FF2B5EF4-FFF2-40B4-BE49-F238E27FC236}">
+                <a16:creationId xmlns:a16="http://schemas.microsoft.com/office/drawing/2014/main" id="{96658C95-22C4-F149-B107-4D98276C1D8E}"/>
+              </a:ext>
+            </a:extLst>
+          </p:cNvPr>
+          <p:cNvCxnSpPr>
+            <a:cxnSpLocks/>
+          </p:cNvCxnSpPr>
+          <p:nvPr/>
+        </p:nvCxnSpPr>
+        <p:spPr>
+          <a:xfrm>
+            <a:off x="9738417" y="3704484"/>
+            <a:ext cx="0" cy="2089758"/>
+          </a:xfrm>
+          <a:prstGeom prst="straightConnector1">
+            <a:avLst/>
+          </a:prstGeom>
+          <a:ln w="76200">
+            <a:tailEnd type="triangle"/>
+          </a:ln>
+        </p:spPr>
+        <p:style>
+          <a:lnRef idx="1">
+            <a:schemeClr val="accent1"/>
+          </a:lnRef>
+          <a:fillRef idx="0">
+            <a:schemeClr val="accent1"/>
+          </a:fillRef>
+          <a:effectRef idx="0">
+            <a:schemeClr val="accent1"/>
+          </a:effectRef>
+          <a:fontRef idx="minor">
+            <a:schemeClr val="tx1"/>
+          </a:fontRef>
+        </p:style>
+      </p:cxnSp>
+      <p:cxnSp>
+        <p:nvCxnSpPr>
+          <p:cNvPr id="34" name="Straight Arrow Connector 33">
+            <a:extLst>
+              <a:ext uri="{FF2B5EF4-FFF2-40B4-BE49-F238E27FC236}">
+                <a16:creationId xmlns:a16="http://schemas.microsoft.com/office/drawing/2014/main" id="{E789010A-A3E8-924A-9DD4-58B04CB0CC09}"/>
+              </a:ext>
+            </a:extLst>
+          </p:cNvPr>
+          <p:cNvCxnSpPr>
+            <a:cxnSpLocks/>
+          </p:cNvCxnSpPr>
+          <p:nvPr/>
+        </p:nvCxnSpPr>
+        <p:spPr>
+          <a:xfrm>
+            <a:off x="9474506" y="5090129"/>
+            <a:ext cx="5257" cy="708301"/>
+          </a:xfrm>
+          <a:prstGeom prst="straightConnector1">
+            <a:avLst/>
+          </a:prstGeom>
+          <a:ln w="76200">
+            <a:tailEnd type="triangle"/>
+          </a:ln>
+        </p:spPr>
+        <p:style>
+          <a:lnRef idx="1">
+            <a:schemeClr val="accent1"/>
+          </a:lnRef>
+          <a:fillRef idx="0">
+            <a:schemeClr val="accent1"/>
+          </a:fillRef>
+          <a:effectRef idx="0">
+            <a:schemeClr val="accent1"/>
+          </a:effectRef>
+          <a:fontRef idx="minor">
+            <a:schemeClr val="tx1"/>
+          </a:fontRef>
+        </p:style>
+      </p:cxnSp>
+      <p:cxnSp>
+        <p:nvCxnSpPr>
+          <p:cNvPr id="35" name="Straight Arrow Connector 34">
+            <a:extLst>
+              <a:ext uri="{FF2B5EF4-FFF2-40B4-BE49-F238E27FC236}">
+                <a16:creationId xmlns:a16="http://schemas.microsoft.com/office/drawing/2014/main" id="{32400C99-6E5B-9E43-920E-A83996C9D28E}"/>
+              </a:ext>
+            </a:extLst>
+          </p:cNvPr>
+          <p:cNvCxnSpPr>
+            <a:cxnSpLocks/>
+          </p:cNvCxnSpPr>
+          <p:nvPr/>
+        </p:nvCxnSpPr>
+        <p:spPr>
+          <a:xfrm flipH="1">
+            <a:off x="10583805" y="4412785"/>
+            <a:ext cx="4803" cy="1381457"/>
+          </a:xfrm>
+          <a:prstGeom prst="straightConnector1">
+            <a:avLst/>
+          </a:prstGeom>
+          <a:ln w="76200">
+            <a:tailEnd type="triangle"/>
+          </a:ln>
+        </p:spPr>
+        <p:style>
+          <a:lnRef idx="1">
+            <a:schemeClr val="accent1"/>
+          </a:lnRef>
+          <a:fillRef idx="0">
+            <a:schemeClr val="accent1"/>
+          </a:fillRef>
+          <a:effectRef idx="0">
+            <a:schemeClr val="accent1"/>
+          </a:effectRef>
+          <a:fontRef idx="minor">
+            <a:schemeClr val="tx1"/>
+          </a:fontRef>
+        </p:style>
+      </p:cxnSp>
+      <p:cxnSp>
+        <p:nvCxnSpPr>
+          <p:cNvPr id="37" name="Straight Arrow Connector 36">
+            <a:extLst>
+              <a:ext uri="{FF2B5EF4-FFF2-40B4-BE49-F238E27FC236}">
+                <a16:creationId xmlns:a16="http://schemas.microsoft.com/office/drawing/2014/main" id="{CABE5568-2E48-1143-91C5-87A8546C5997}"/>
+              </a:ext>
+            </a:extLst>
+          </p:cNvPr>
+          <p:cNvCxnSpPr/>
+          <p:nvPr/>
+        </p:nvCxnSpPr>
+        <p:spPr>
+          <a:xfrm flipV="1">
+            <a:off x="9927602" y="3699724"/>
+            <a:ext cx="0" cy="2036793"/>
+          </a:xfrm>
+          <a:prstGeom prst="straightConnector1">
+            <a:avLst/>
+          </a:prstGeom>
+          <a:ln w="76200">
+            <a:solidFill>
+              <a:srgbClr val="00B050"/>
+            </a:solidFill>
+            <a:tailEnd type="triangle"/>
+          </a:ln>
+        </p:spPr>
+        <p:style>
+          <a:lnRef idx="1">
+            <a:schemeClr val="accent1"/>
+          </a:lnRef>
+          <a:fillRef idx="0">
+            <a:schemeClr val="accent1"/>
+          </a:fillRef>
+          <a:effectRef idx="0">
+            <a:schemeClr val="accent1"/>
+          </a:effectRef>
+          <a:fontRef idx="minor">
+            <a:schemeClr val="tx1"/>
+          </a:fontRef>
+        </p:style>
+      </p:cxnSp>
+    </p:spTree>
+    <p:extLst>
+      <p:ext uri="{BB962C8B-B14F-4D97-AF65-F5344CB8AC3E}">
+        <p14:creationId xmlns:p14="http://schemas.microsoft.com/office/powerpoint/2010/main" val="1608126075"/>
+      </p:ext>
+    </p:extLst>
+  </p:cSld>
+  <p:clrMapOvr>
+    <a:masterClrMapping/>
+  </p:clrMapOvr>
+</p:sld>
+</file>
+
+<file path=ppt/slides/slide6.xml><?xml version="1.0" encoding="utf-8"?>
+<p:sld xmlns:a="http://schemas.openxmlformats.org/drawingml/2006/main" xmlns:r="http://schemas.openxmlformats.org/officeDocument/2006/relationships" xmlns:p="http://schemas.openxmlformats.org/presentationml/2006/main">
+  <p:cSld>
+    <p:spTree>
+      <p:nvGrpSpPr>
+        <p:cNvPr id="1" name=""/>
+        <p:cNvGrpSpPr/>
+        <p:nvPr/>
+      </p:nvGrpSpPr>
+      <p:grpSpPr>
+        <a:xfrm>
+          <a:off x="0" y="0"/>
+          <a:ext cx="0" cy="0"/>
+          <a:chOff x="0" y="0"/>
+          <a:chExt cx="0" cy="0"/>
+        </a:xfrm>
+      </p:grpSpPr>
+      <p:sp>
+        <p:nvSpPr>
+          <p:cNvPr id="2" name="Title 1">
+            <a:extLst>
+              <a:ext uri="{FF2B5EF4-FFF2-40B4-BE49-F238E27FC236}">
+                <a16:creationId xmlns:a16="http://schemas.microsoft.com/office/drawing/2014/main" id="{99D67142-EFB4-8243-9654-6D5A3B2F2B78}"/>
+              </a:ext>
+            </a:extLst>
+          </p:cNvPr>
+          <p:cNvSpPr>
+            <a:spLocks noGrp="1"/>
+          </p:cNvSpPr>
+          <p:nvPr>
+            <p:ph type="title"/>
+          </p:nvPr>
+        </p:nvSpPr>
+        <p:spPr/>
+        <p:txBody>
+          <a:bodyPr/>
+          <a:lstStyle/>
+          <a:p>
+            <a:r>
+              <a:rPr lang="en-US" dirty="0"/>
+              <a:t>CANDLE implementation</a:t>
+            </a:r>
+          </a:p>
+        </p:txBody>
+      </p:sp>
+      <p:sp>
+        <p:nvSpPr>
+          <p:cNvPr id="3" name="Content Placeholder 2">
+            <a:extLst>
+              <a:ext uri="{FF2B5EF4-FFF2-40B4-BE49-F238E27FC236}">
+                <a16:creationId xmlns:a16="http://schemas.microsoft.com/office/drawing/2014/main" id="{3F7CAF05-4D03-AC4E-AC7E-A269FDFEF406}"/>
+              </a:ext>
+            </a:extLst>
+          </p:cNvPr>
+          <p:cNvSpPr>
+            <a:spLocks noGrp="1"/>
+          </p:cNvSpPr>
+          <p:nvPr>
+            <p:ph idx="1"/>
+          </p:nvPr>
+        </p:nvSpPr>
+        <p:spPr/>
+        <p:txBody>
+          <a:bodyPr/>
+          <a:lstStyle/>
+          <a:p>
+            <a:r>
+              <a:rPr lang="en-US" sz="2400" dirty="0"/>
+              <a:t>Model-agnostic framework code for implementing a PBT workflow</a:t>
+            </a:r>
+          </a:p>
+          <a:p>
+            <a:pPr lvl="1"/>
+            <a:r>
+              <a:rPr lang="en-US" sz="2000" dirty="0"/>
+              <a:t>Parallelized with mpi4Py</a:t>
+            </a:r>
+          </a:p>
+          <a:p>
+            <a:pPr lvl="1"/>
+            <a:r>
+              <a:rPr lang="en-US" sz="2000" dirty="0" err="1"/>
+              <a:t>PBTMetaDataStore</a:t>
+            </a:r>
+            <a:r>
+              <a:rPr lang="en-US" sz="2000" dirty="0"/>
+              <a:t> class: in-memory datastore for performance and hyperparameter data</a:t>
+            </a:r>
+          </a:p>
+          <a:p>
+            <a:pPr lvl="1"/>
+            <a:r>
+              <a:rPr lang="en-US" sz="2000" dirty="0" err="1"/>
+              <a:t>PBTClient</a:t>
+            </a:r>
+            <a:r>
+              <a:rPr lang="en-US" sz="2000" dirty="0"/>
+              <a:t> class: allow individual model to communicate with the datastore</a:t>
+            </a:r>
+          </a:p>
+          <a:p>
+            <a:pPr lvl="1"/>
+            <a:r>
+              <a:rPr lang="en-US" sz="2000" dirty="0" err="1"/>
+              <a:t>PBTCallback</a:t>
+            </a:r>
+            <a:r>
+              <a:rPr lang="en-US" sz="2000" dirty="0"/>
+              <a:t> class: pass performance data and weights to the data store, via </a:t>
+            </a:r>
+            <a:r>
+              <a:rPr lang="en-US" sz="2000" dirty="0" err="1"/>
+              <a:t>Keras</a:t>
+            </a:r>
+            <a:r>
+              <a:rPr lang="en-US" sz="2000" dirty="0"/>
+              <a:t> callback</a:t>
+            </a:r>
+          </a:p>
+          <a:p>
+            <a:pPr lvl="1"/>
+            <a:r>
+              <a:rPr lang="en-US" sz="2000" dirty="0" err="1"/>
+              <a:t>PBTWorker</a:t>
+            </a:r>
+            <a:r>
+              <a:rPr lang="en-US" sz="2000" dirty="0"/>
+              <a:t> interface: provide API for replacing model parameters and weights</a:t>
+            </a:r>
+          </a:p>
+          <a:p>
+            <a:endParaRPr lang="en-US" sz="2400" dirty="0"/>
+          </a:p>
+          <a:p>
+            <a:r>
+              <a:rPr lang="en-US" sz="2400" spc="-1" dirty="0">
+                <a:solidFill>
+                  <a:srgbClr val="232425"/>
+                </a:solidFill>
+                <a:latin typeface="Arial"/>
+              </a:rPr>
+              <a:t>Steps for implementing PBT for a new model</a:t>
+            </a:r>
+          </a:p>
+          <a:p>
+            <a:pPr lvl="1"/>
+            <a:r>
+              <a:rPr lang="en-US" sz="2000" dirty="0"/>
+              <a:t>PBT parameter configuration (JSON) file</a:t>
+            </a:r>
+          </a:p>
+          <a:p>
+            <a:pPr lvl="1"/>
+            <a:r>
+              <a:rPr lang="en-US" sz="2000" dirty="0"/>
+              <a:t>Modify workflow script which implements this framework (very close to boilerplate)</a:t>
+            </a:r>
+          </a:p>
+          <a:p>
+            <a:endParaRPr lang="en-US" dirty="0"/>
+          </a:p>
+        </p:txBody>
+      </p:sp>
+    </p:spTree>
+    <p:extLst>
+      <p:ext uri="{BB962C8B-B14F-4D97-AF65-F5344CB8AC3E}">
+        <p14:creationId xmlns:p14="http://schemas.microsoft.com/office/powerpoint/2010/main" val="2557902589"/>
+      </p:ext>
+    </p:extLst>
+  </p:cSld>
+  <p:clrMapOvr>
+    <a:masterClrMapping/>
+  </p:clrMapOvr>
+</p:sld>
+</file>
+
+<file path=ppt/slides/slide7.xml><?xml version="1.0" encoding="utf-8"?>
+<p:sld xmlns:a="http://schemas.openxmlformats.org/drawingml/2006/main" xmlns:r="http://schemas.openxmlformats.org/officeDocument/2006/relationships" xmlns:p="http://schemas.openxmlformats.org/presentationml/2006/main">
+  <p:cSld>
+    <p:spTree>
+      <p:nvGrpSpPr>
+        <p:cNvPr id="1" name=""/>
+        <p:cNvGrpSpPr/>
+        <p:nvPr/>
+      </p:nvGrpSpPr>
+      <p:grpSpPr>
+        <a:xfrm>
+          <a:off x="0" y="0"/>
+          <a:ext cx="0" cy="0"/>
+          <a:chOff x="0" y="0"/>
+          <a:chExt cx="0" cy="0"/>
+        </a:xfrm>
+      </p:grpSpPr>
+      <p:sp>
+        <p:nvSpPr>
+          <p:cNvPr id="2" name="Title 1">
+            <a:extLst>
+              <a:ext uri="{FF2B5EF4-FFF2-40B4-BE49-F238E27FC236}">
+                <a16:creationId xmlns:a16="http://schemas.microsoft.com/office/drawing/2014/main" id="{6EBB8726-C388-8B43-9A92-947E935D42E3}"/>
+              </a:ext>
+            </a:extLst>
+          </p:cNvPr>
+          <p:cNvSpPr>
+            <a:spLocks noGrp="1"/>
+          </p:cNvSpPr>
+          <p:nvPr>
+            <p:ph type="title"/>
+          </p:nvPr>
+        </p:nvSpPr>
+        <p:spPr/>
+        <p:txBody>
+          <a:bodyPr/>
+          <a:lstStyle/>
+          <a:p>
+            <a:r>
+              <a:rPr lang="en-US" dirty="0"/>
+              <a:t>Hyperparameter search space config file</a:t>
+            </a:r>
+          </a:p>
+        </p:txBody>
+      </p:sp>
+      <p:pic>
+        <p:nvPicPr>
+          <p:cNvPr id="5" name="Content Placeholder 4">
+            <a:extLst>
+              <a:ext uri="{FF2B5EF4-FFF2-40B4-BE49-F238E27FC236}">
+                <a16:creationId xmlns:a16="http://schemas.microsoft.com/office/drawing/2014/main" id="{22BFBEA3-EBB4-A24B-AECB-85E4B11687C9}"/>
+              </a:ext>
+            </a:extLst>
+          </p:cNvPr>
+          <p:cNvPicPr>
+            <a:picLocks noGrp="1" noChangeAspect="1"/>
+          </p:cNvPicPr>
+          <p:nvPr>
+            <p:ph idx="1"/>
+          </p:nvPr>
+        </p:nvPicPr>
+        <p:blipFill>
+          <a:blip r:embed="rId2">
+            <a:extLst>
+              <a:ext uri="{28A0092B-C50C-407E-A947-70E740481C1C}">
+                <a14:useLocalDpi xmlns:a14="http://schemas.microsoft.com/office/drawing/2010/main" val="0"/>
+              </a:ext>
+            </a:extLst>
+          </a:blip>
+          <a:stretch>
+            <a:fillRect/>
+          </a:stretch>
+        </p:blipFill>
+        <p:spPr>
+          <a:xfrm>
+            <a:off x="945931" y="1171575"/>
+            <a:ext cx="7936426" cy="5101344"/>
+          </a:xfrm>
+        </p:spPr>
+      </p:pic>
+    </p:spTree>
+    <p:extLst>
+      <p:ext uri="{BB962C8B-B14F-4D97-AF65-F5344CB8AC3E}">
+        <p14:creationId xmlns:p14="http://schemas.microsoft.com/office/powerpoint/2010/main" val="3891723988"/>
+      </p:ext>
+    </p:extLst>
+  </p:cSld>
+  <p:clrMapOvr>
+    <a:masterClrMapping/>
+  </p:clrMapOvr>
+</p:sld>
+</file>
+
+<file path=ppt/slides/slide8.xml><?xml version="1.0" encoding="utf-8"?>
+<p:sld xmlns:a="http://schemas.openxmlformats.org/drawingml/2006/main" xmlns:r="http://schemas.openxmlformats.org/officeDocument/2006/relationships" xmlns:p="http://schemas.openxmlformats.org/presentationml/2006/main">
+  <p:cSld>
+    <p:spTree>
+      <p:nvGrpSpPr>
+        <p:cNvPr id="1" name=""/>
+        <p:cNvGrpSpPr/>
+        <p:nvPr/>
+      </p:nvGrpSpPr>
+      <p:grpSpPr>
+        <a:xfrm>
+          <a:off x="0" y="0"/>
+          <a:ext cx="0" cy="0"/>
+          <a:chOff x="0" y="0"/>
+          <a:chExt cx="0" cy="0"/>
+        </a:xfrm>
+      </p:grpSpPr>
+      <p:sp>
+        <p:nvSpPr>
+          <p:cNvPr id="2" name="Title 1">
+            <a:extLst>
+              <a:ext uri="{FF2B5EF4-FFF2-40B4-BE49-F238E27FC236}">
+                <a16:creationId xmlns:a16="http://schemas.microsoft.com/office/drawing/2014/main" id="{D40BF1D8-B53E-6546-9019-F8E98F00E2A7}"/>
+              </a:ext>
+            </a:extLst>
+          </p:cNvPr>
+          <p:cNvSpPr>
+            <a:spLocks noGrp="1"/>
+          </p:cNvSpPr>
+          <p:nvPr>
+            <p:ph type="title"/>
+          </p:nvPr>
+        </p:nvSpPr>
+        <p:spPr/>
+        <p:txBody>
+          <a:bodyPr/>
+          <a:lstStyle/>
+          <a:p>
+            <a:r>
+              <a:rPr lang="en-US" dirty="0"/>
+              <a:t>NAS background</a:t>
+            </a:r>
+          </a:p>
+        </p:txBody>
+      </p:sp>
+      <p:sp>
+        <p:nvSpPr>
+          <p:cNvPr id="3" name="Content Placeholder 2">
+            <a:extLst>
+              <a:ext uri="{FF2B5EF4-FFF2-40B4-BE49-F238E27FC236}">
+                <a16:creationId xmlns:a16="http://schemas.microsoft.com/office/drawing/2014/main" id="{C7BD6F05-45FC-BA40-BA22-FD994C306877}"/>
+              </a:ext>
+            </a:extLst>
+          </p:cNvPr>
+          <p:cNvSpPr>
+            <a:spLocks noGrp="1"/>
+          </p:cNvSpPr>
+          <p:nvPr>
+            <p:ph idx="1"/>
+          </p:nvPr>
+        </p:nvSpPr>
+        <p:spPr/>
+        <p:txBody>
+          <a:bodyPr/>
+          <a:lstStyle/>
+          <a:p>
+            <a:r>
+              <a:rPr lang="en-US" dirty="0"/>
+              <a:t>How does one pick a deep learning architecture?</a:t>
+            </a:r>
+          </a:p>
+          <a:p>
+            <a:pPr lvl="1"/>
+            <a:r>
+              <a:rPr lang="en-US" dirty="0"/>
+              <a:t>What kinds of layers?</a:t>
+            </a:r>
+          </a:p>
+          <a:p>
+            <a:pPr lvl="1"/>
+            <a:r>
+              <a:rPr lang="en-US" dirty="0"/>
+              <a:t>How is the network structured?</a:t>
+            </a:r>
+          </a:p>
+          <a:p>
+            <a:endParaRPr lang="en-US" dirty="0"/>
+          </a:p>
+          <a:p>
+            <a:r>
+              <a:rPr lang="en-US" dirty="0"/>
+              <a:t>Options:</a:t>
+            </a:r>
+          </a:p>
+          <a:p>
+            <a:pPr marL="803275" lvl="1" indent="-457200">
+              <a:buFont typeface="+mj-lt"/>
+              <a:buAutoNum type="arabicPeriod"/>
+            </a:pPr>
+            <a:r>
+              <a:rPr lang="en-US" dirty="0"/>
+              <a:t>Off-the-shelf: start from known architecture for, e.g., image data</a:t>
+            </a:r>
+          </a:p>
+          <a:p>
+            <a:pPr marL="803275" lvl="1" indent="-457200">
+              <a:buFont typeface="+mj-lt"/>
+              <a:buAutoNum type="arabicPeriod"/>
+            </a:pPr>
+            <a:r>
+              <a:rPr lang="en-US" dirty="0"/>
+              <a:t>Manually: Design from scratch via trial-and-error</a:t>
+            </a:r>
+          </a:p>
+          <a:p>
+            <a:pPr marL="803275" lvl="1" indent="-457200">
+              <a:buFont typeface="+mj-lt"/>
+              <a:buAutoNum type="arabicPeriod"/>
+            </a:pPr>
+            <a:r>
+              <a:rPr lang="en-US" dirty="0"/>
+              <a:t>Machine learning: neural architecture search (NAS)</a:t>
+            </a:r>
+          </a:p>
+          <a:p>
+            <a:pPr marL="1092200" lvl="2" indent="-457200"/>
+            <a:r>
+              <a:rPr lang="en-US" dirty="0"/>
+              <a:t>Search model descriptions of neural network specifications with given search space</a:t>
+            </a:r>
+          </a:p>
+          <a:p>
+            <a:pPr marL="1092200" lvl="2" indent="-457200"/>
+            <a:r>
+              <a:rPr lang="en-US" dirty="0"/>
+              <a:t>Learn model architecture by training large number of models</a:t>
+            </a:r>
+          </a:p>
+          <a:p>
+            <a:pPr marL="1092200" lvl="2" indent="-457200"/>
+            <a:endParaRPr lang="en-US" dirty="0"/>
+          </a:p>
+          <a:p>
+            <a:pPr lvl="1"/>
+            <a:endParaRPr lang="en-US" dirty="0"/>
+          </a:p>
+          <a:p>
+            <a:endParaRPr lang="en-US" dirty="0"/>
+          </a:p>
+          <a:p>
+            <a:pPr lvl="1"/>
+            <a:endParaRPr lang="en-US" dirty="0"/>
+          </a:p>
+        </p:txBody>
+      </p:sp>
+    </p:spTree>
+    <p:extLst>
+      <p:ext uri="{BB962C8B-B14F-4D97-AF65-F5344CB8AC3E}">
+        <p14:creationId xmlns:p14="http://schemas.microsoft.com/office/powerpoint/2010/main" val="2042118168"/>
+      </p:ext>
+    </p:extLst>
+  </p:cSld>
+  <p:clrMapOvr>
+    <a:masterClrMapping/>
+  </p:clrMapOvr>
+</p:sld>
+</file>
+
+<file path=ppt/slides/slide9.xml><?xml version="1.0" encoding="utf-8"?>
+<p:sld xmlns:a="http://schemas.openxmlformats.org/drawingml/2006/main" xmlns:r="http://schemas.openxmlformats.org/officeDocument/2006/relationships" xmlns:p="http://schemas.openxmlformats.org/presentationml/2006/main">
+  <p:cSld>
+    <p:spTree>
+      <p:nvGrpSpPr>
+        <p:cNvPr id="1" name=""/>
+        <p:cNvGrpSpPr/>
+        <p:nvPr/>
+      </p:nvGrpSpPr>
+      <p:grpSpPr>
+        <a:xfrm>
+          <a:off x="0" y="0"/>
+          <a:ext cx="0" cy="0"/>
+          <a:chOff x="0" y="0"/>
+          <a:chExt cx="0" cy="0"/>
+        </a:xfrm>
+      </p:grpSpPr>
+      <p:sp>
+        <p:nvSpPr>
+          <p:cNvPr id="2" name="Title 1">
+            <a:extLst>
+              <a:ext uri="{FF2B5EF4-FFF2-40B4-BE49-F238E27FC236}">
+                <a16:creationId xmlns:a16="http://schemas.microsoft.com/office/drawing/2014/main" id="{8F3FA2AD-6F1D-6C4D-B5CB-D3DF710D3D8E}"/>
+              </a:ext>
+            </a:extLst>
+          </p:cNvPr>
+          <p:cNvSpPr>
+            <a:spLocks noGrp="1"/>
+          </p:cNvSpPr>
+          <p:nvPr>
+            <p:ph type="title"/>
+          </p:nvPr>
+        </p:nvSpPr>
+        <p:spPr/>
+        <p:txBody>
+          <a:bodyPr/>
+          <a:lstStyle/>
+          <a:p>
+            <a:r>
+              <a:rPr lang="en-US" dirty="0"/>
+              <a:t>DARTS algorithm</a:t>
+            </a:r>
+          </a:p>
+        </p:txBody>
+      </p:sp>
+      <p:sp>
+        <p:nvSpPr>
+          <p:cNvPr id="3" name="Content Placeholder 2">
+            <a:extLst>
+              <a:ext uri="{FF2B5EF4-FFF2-40B4-BE49-F238E27FC236}">
+                <a16:creationId xmlns:a16="http://schemas.microsoft.com/office/drawing/2014/main" id="{FDCCBF8A-8C06-6F49-8028-A0202F7EBA88}"/>
+              </a:ext>
+            </a:extLst>
+          </p:cNvPr>
+          <p:cNvSpPr>
+            <a:spLocks noGrp="1"/>
+          </p:cNvSpPr>
+          <p:nvPr>
+            <p:ph idx="1"/>
+          </p:nvPr>
+        </p:nvSpPr>
+        <p:spPr/>
+        <p:txBody>
+          <a:bodyPr/>
+          <a:lstStyle/>
+          <a:p>
+            <a:r>
+              <a:rPr lang="en-US" dirty="0"/>
+              <a:t>Computational challenge: NAS is expensive</a:t>
+            </a:r>
+          </a:p>
+          <a:p>
+            <a:pPr lvl="1"/>
+            <a:r>
+              <a:rPr lang="en-US" dirty="0"/>
+              <a:t>Standard techniques may require 10</a:t>
+            </a:r>
+            <a:r>
+              <a:rPr lang="en-US" baseline="30000" dirty="0"/>
+              <a:t>5</a:t>
+            </a:r>
+            <a:r>
+              <a:rPr lang="en-US" dirty="0"/>
+              <a:t> GPU hours</a:t>
+            </a:r>
+          </a:p>
+          <a:p>
+            <a:pPr lvl="1"/>
+            <a:r>
+              <a:rPr lang="en-US" dirty="0"/>
+              <a:t>Alternative ’one-shot’ techniques: multiple architectures as subgraphs</a:t>
+            </a:r>
+          </a:p>
+          <a:p>
+            <a:endParaRPr lang="en-US" dirty="0"/>
+          </a:p>
+          <a:p>
+            <a:r>
+              <a:rPr lang="en-US" dirty="0"/>
+              <a:t>DARTS (</a:t>
+            </a:r>
+            <a:r>
+              <a:rPr lang="en-US" dirty="0">
+                <a:hlinkClick r:id="rId2"/>
+              </a:rPr>
+              <a:t>https://arxiv.org/abs/1806.09055</a:t>
+            </a:r>
+            <a:r>
+              <a:rPr lang="en-US" dirty="0"/>
+              <a:t>)</a:t>
+            </a:r>
+          </a:p>
+          <a:p>
+            <a:pPr lvl="1"/>
+            <a:r>
+              <a:rPr lang="en-US" dirty="0"/>
+              <a:t>Differentiable architecture search</a:t>
+            </a:r>
+          </a:p>
+          <a:p>
+            <a:pPr lvl="1"/>
+            <a:r>
+              <a:rPr lang="en-US" dirty="0"/>
+              <a:t>Continuous search space</a:t>
+            </a:r>
+          </a:p>
+          <a:p>
+            <a:pPr lvl="1"/>
+            <a:r>
+              <a:rPr lang="en-US" dirty="0"/>
+              <a:t>Bilevel optimization: architecture and weights</a:t>
+            </a:r>
+          </a:p>
+          <a:p>
+            <a:pPr lvl="1"/>
+            <a:endParaRPr lang="en-US" dirty="0"/>
+          </a:p>
+        </p:txBody>
+      </p:sp>
+      <p:pic>
+        <p:nvPicPr>
+          <p:cNvPr id="5" name="Picture 4">
+            <a:extLst>
+              <a:ext uri="{FF2B5EF4-FFF2-40B4-BE49-F238E27FC236}">
+                <a16:creationId xmlns:a16="http://schemas.microsoft.com/office/drawing/2014/main" id="{5421AE36-E03A-5940-ADF8-18715579FE0C}"/>
+              </a:ext>
+            </a:extLst>
+          </p:cNvPr>
+          <p:cNvPicPr/>
+          <p:nvPr/>
+        </p:nvPicPr>
+        <p:blipFill>
+          <a:blip r:embed="rId3"/>
+          <a:stretch>
+            <a:fillRect/>
+          </a:stretch>
+        </p:blipFill>
+        <p:spPr>
+          <a:xfrm>
+            <a:off x="7620000" y="3130396"/>
+            <a:ext cx="4203065" cy="2650293"/>
+          </a:xfrm>
+          <a:prstGeom prst="rect">
+            <a:avLst/>
+          </a:prstGeom>
+        </p:spPr>
+      </p:pic>
+    </p:spTree>
+    <p:extLst>
+      <p:ext uri="{BB962C8B-B14F-4D97-AF65-F5344CB8AC3E}">
+        <p14:creationId xmlns:p14="http://schemas.microsoft.com/office/powerpoint/2010/main" val="1327185159"/>
       </p:ext>
     </p:extLst>
   </p:cSld>
@@ -5225,6 +8501,21 @@
 </file>
 
 <file path=customXml/item1.xml><?xml version="1.0" encoding="utf-8"?>
+<?mso-contentType ?>
+<FormTemplates xmlns="http://schemas.microsoft.com/sharepoint/v3/contenttype/forms">
+  <Display>DocumentLibraryForm</Display>
+  <Edit>DocumentLibraryForm</Edit>
+  <New>DocumentLibraryForm</New>
+</FormTemplates>
+</file>
+
+<file path=customXml/item2.xml><?xml version="1.0" encoding="utf-8"?>
+<p:properties xmlns:p="http://schemas.microsoft.com/office/2006/metadata/properties" xmlns:xsi="http://www.w3.org/2001/XMLSchema-instance" xmlns:pc="http://schemas.microsoft.com/office/infopath/2007/PartnerControls">
+  <documentManagement/>
+</p:properties>
+</file>
+
+<file path=customXml/item3.xml><?xml version="1.0" encoding="utf-8"?>
 <ct:contentTypeSchema xmlns:ct="http://schemas.microsoft.com/office/2006/metadata/contentType" xmlns:ma="http://schemas.microsoft.com/office/2006/metadata/properties/metaAttributes" ct:_="" ma:_="" ma:contentTypeName="Document" ma:contentTypeID="0x010100693156C96291C349BBF8B640319D465D" ma:contentTypeVersion="0" ma:contentTypeDescription="Create a new document." ma:contentTypeScope="" ma:versionID="8a71be8d30b42e8e74cf70a4a4cbda4c">
   <xsd:schema xmlns:xsd="http://www.w3.org/2001/XMLSchema" xmlns:p="http://schemas.microsoft.com/office/2006/metadata/properties" targetNamespace="http://schemas.microsoft.com/office/2006/metadata/properties" ma:root="true" ma:fieldsID="4aeb20c0e3442673af7ee10786458764">
     <xsd:element name="properties">
@@ -5273,22 +8564,30 @@
 </ct:contentTypeSchema>
 </file>
 
-<file path=customXml/item2.xml><?xml version="1.0" encoding="utf-8"?>
-<?mso-contentType ?>
-<FormTemplates xmlns="http://schemas.microsoft.com/sharepoint/v3/contenttype/forms">
-  <Display>DocumentLibraryForm</Display>
-  <Edit>DocumentLibraryForm</Edit>
-  <New>DocumentLibraryForm</New>
-</FormTemplates>
+<file path=customXml/itemProps1.xml><?xml version="1.0" encoding="utf-8"?>
+<ds:datastoreItem xmlns:ds="http://schemas.openxmlformats.org/officeDocument/2006/customXml" ds:itemID="{19E20559-B232-4371-8690-E3D8007EDB82}">
+  <ds:schemaRefs>
+    <ds:schemaRef ds:uri="http://schemas.microsoft.com/sharepoint/v3/contenttype/forms"/>
+  </ds:schemaRefs>
+</ds:datastoreItem>
 </file>
 
-<file path=customXml/item3.xml><?xml version="1.0" encoding="utf-8"?>
-<p:properties xmlns:p="http://schemas.microsoft.com/office/2006/metadata/properties" xmlns:xsi="http://www.w3.org/2001/XMLSchema-instance" xmlns:pc="http://schemas.microsoft.com/office/infopath/2007/PartnerControls">
-  <documentManagement/>
-</p:properties>
+<file path=customXml/itemProps2.xml><?xml version="1.0" encoding="utf-8"?>
+<ds:datastoreItem xmlns:ds="http://schemas.openxmlformats.org/officeDocument/2006/customXml" ds:itemID="{A50EC660-24D0-43A0-AE5E-E274115E726B}">
+  <ds:schemaRefs>
+    <ds:schemaRef ds:uri="http://purl.org/dc/dcmitype/"/>
+    <ds:schemaRef ds:uri="http://schemas.microsoft.com/office/2006/metadata/properties"/>
+    <ds:schemaRef ds:uri="http://purl.org/dc/elements/1.1/"/>
+    <ds:schemaRef ds:uri="http://schemas.microsoft.com/office/2006/documentManagement/types"/>
+    <ds:schemaRef ds:uri="http://schemas.openxmlformats.org/package/2006/metadata/core-properties"/>
+    <ds:schemaRef ds:uri="http://www.w3.org/XML/1998/namespace"/>
+    <ds:schemaRef ds:uri="http://purl.org/dc/terms/"/>
+    <ds:schemaRef ds:uri="http://schemas.microsoft.com/office/infopath/2007/PartnerControls"/>
+  </ds:schemaRefs>
+</ds:datastoreItem>
 </file>
 
-<file path=customXml/itemProps1.xml><?xml version="1.0" encoding="utf-8"?>
+<file path=customXml/itemProps3.xml><?xml version="1.0" encoding="utf-8"?>
 <ds:datastoreItem xmlns:ds="http://schemas.openxmlformats.org/officeDocument/2006/customXml" ds:itemID="{D85F602D-FF92-4BDD-B4C2-093468CCF754}">
   <ds:schemaRefs>
     <ds:schemaRef ds:uri="http://schemas.microsoft.com/office/2006/metadata/contentType"/>
@@ -5301,27 +8600,4 @@
     <ds:schemaRef ds:uri="http://schemas.microsoft.com/office/internal/2005/internalDocumentation"/>
   </ds:schemaRefs>
 </ds:datastoreItem>
-</file>
-
-<file path=customXml/itemProps2.xml><?xml version="1.0" encoding="utf-8"?>
-<ds:datastoreItem xmlns:ds="http://schemas.openxmlformats.org/officeDocument/2006/customXml" ds:itemID="{19E20559-B232-4371-8690-E3D8007EDB82}">
-  <ds:schemaRefs>
-    <ds:schemaRef ds:uri="http://schemas.microsoft.com/sharepoint/v3/contenttype/forms"/>
-  </ds:schemaRefs>
-</ds:datastoreItem>
-</file>
-
-<file path=customXml/itemProps3.xml><?xml version="1.0" encoding="utf-8"?>
-<ds:datastoreItem xmlns:ds="http://schemas.openxmlformats.org/officeDocument/2006/customXml" ds:itemID="{A50EC660-24D0-43A0-AE5E-E274115E726B}">
-  <ds:schemaRefs>
-    <ds:schemaRef ds:uri="http://purl.org/dc/dcmitype/"/>
-    <ds:schemaRef ds:uri="http://schemas.microsoft.com/office/2006/metadata/properties"/>
-    <ds:schemaRef ds:uri="http://purl.org/dc/elements/1.1/"/>
-    <ds:schemaRef ds:uri="http://schemas.microsoft.com/office/2006/documentManagement/types"/>
-    <ds:schemaRef ds:uri="http://schemas.openxmlformats.org/package/2006/metadata/core-properties"/>
-    <ds:schemaRef ds:uri="http://www.w3.org/XML/1998/namespace"/>
-    <ds:schemaRef ds:uri="http://purl.org/dc/terms/"/>
-    <ds:schemaRef ds:uri="http://schemas.microsoft.com/office/infopath/2007/PartnerControls"/>
-  </ds:schemaRefs>
-</ds:datastoreItem>
 </file>
</xml_diff>